<commit_message>
Visualization file of functions structure updated.
</commit_message>
<xml_diff>
--- a/docs/chess_structure.pptx
+++ b/docs/chess_structure.pptx
@@ -7,6 +7,9 @@
   <p:sldIdLst>
     <p:sldId id="256" r:id="rId2"/>
     <p:sldId id="257" r:id="rId3"/>
+    <p:sldId id="258" r:id="rId4"/>
+    <p:sldId id="259" r:id="rId5"/>
+    <p:sldId id="260" r:id="rId6"/>
   </p:sldIdLst>
   <p:sldSz cx="12192000" cy="6858000"/>
   <p:notesSz cx="6858000" cy="9144000"/>
@@ -105,6 +108,11 @@
       </a:defRPr>
     </a:lvl9pPr>
   </p:defaultTextStyle>
+  <p:extLst>
+    <p:ext uri="{EFAFB233-063F-42B5-8137-9DF3F51BA10A}">
+      <p15:sldGuideLst xmlns:p15="http://schemas.microsoft.com/office/powerpoint/2012/main"/>
+    </p:ext>
+  </p:extLst>
 </p:presentation>
 </file>
 
@@ -257,7 +265,7 @@
           <a:p>
             <a:fld id="{3C86F9F8-2D2A-4D0A-8098-1A54311CFD56}" type="datetimeFigureOut">
               <a:rPr lang="fr-CA" smtClean="0"/>
-              <a:t>2025-11-30</a:t>
+              <a:t>2025-12-11</a:t>
             </a:fld>
             <a:endParaRPr lang="fr-CA"/>
           </a:p>
@@ -457,7 +465,7 @@
           <a:p>
             <a:fld id="{3C86F9F8-2D2A-4D0A-8098-1A54311CFD56}" type="datetimeFigureOut">
               <a:rPr lang="fr-CA" smtClean="0"/>
-              <a:t>2025-11-30</a:t>
+              <a:t>2025-12-11</a:t>
             </a:fld>
             <a:endParaRPr lang="fr-CA"/>
           </a:p>
@@ -667,7 +675,7 @@
           <a:p>
             <a:fld id="{3C86F9F8-2D2A-4D0A-8098-1A54311CFD56}" type="datetimeFigureOut">
               <a:rPr lang="fr-CA" smtClean="0"/>
-              <a:t>2025-11-30</a:t>
+              <a:t>2025-12-11</a:t>
             </a:fld>
             <a:endParaRPr lang="fr-CA"/>
           </a:p>
@@ -867,7 +875,7 @@
           <a:p>
             <a:fld id="{3C86F9F8-2D2A-4D0A-8098-1A54311CFD56}" type="datetimeFigureOut">
               <a:rPr lang="fr-CA" smtClean="0"/>
-              <a:t>2025-11-30</a:t>
+              <a:t>2025-12-11</a:t>
             </a:fld>
             <a:endParaRPr lang="fr-CA"/>
           </a:p>
@@ -1143,7 +1151,7 @@
           <a:p>
             <a:fld id="{3C86F9F8-2D2A-4D0A-8098-1A54311CFD56}" type="datetimeFigureOut">
               <a:rPr lang="fr-CA" smtClean="0"/>
-              <a:t>2025-11-30</a:t>
+              <a:t>2025-12-11</a:t>
             </a:fld>
             <a:endParaRPr lang="fr-CA"/>
           </a:p>
@@ -1411,7 +1419,7 @@
           <a:p>
             <a:fld id="{3C86F9F8-2D2A-4D0A-8098-1A54311CFD56}" type="datetimeFigureOut">
               <a:rPr lang="fr-CA" smtClean="0"/>
-              <a:t>2025-11-30</a:t>
+              <a:t>2025-12-11</a:t>
             </a:fld>
             <a:endParaRPr lang="fr-CA"/>
           </a:p>
@@ -1826,7 +1834,7 @@
           <a:p>
             <a:fld id="{3C86F9F8-2D2A-4D0A-8098-1A54311CFD56}" type="datetimeFigureOut">
               <a:rPr lang="fr-CA" smtClean="0"/>
-              <a:t>2025-11-30</a:t>
+              <a:t>2025-12-11</a:t>
             </a:fld>
             <a:endParaRPr lang="fr-CA"/>
           </a:p>
@@ -1968,7 +1976,7 @@
           <a:p>
             <a:fld id="{3C86F9F8-2D2A-4D0A-8098-1A54311CFD56}" type="datetimeFigureOut">
               <a:rPr lang="fr-CA" smtClean="0"/>
-              <a:t>2025-11-30</a:t>
+              <a:t>2025-12-11</a:t>
             </a:fld>
             <a:endParaRPr lang="fr-CA"/>
           </a:p>
@@ -2081,7 +2089,7 @@
           <a:p>
             <a:fld id="{3C86F9F8-2D2A-4D0A-8098-1A54311CFD56}" type="datetimeFigureOut">
               <a:rPr lang="fr-CA" smtClean="0"/>
-              <a:t>2025-11-30</a:t>
+              <a:t>2025-12-11</a:t>
             </a:fld>
             <a:endParaRPr lang="fr-CA"/>
           </a:p>
@@ -2394,7 +2402,7 @@
           <a:p>
             <a:fld id="{3C86F9F8-2D2A-4D0A-8098-1A54311CFD56}" type="datetimeFigureOut">
               <a:rPr lang="fr-CA" smtClean="0"/>
-              <a:t>2025-11-30</a:t>
+              <a:t>2025-12-11</a:t>
             </a:fld>
             <a:endParaRPr lang="fr-CA"/>
           </a:p>
@@ -2683,7 +2691,7 @@
           <a:p>
             <a:fld id="{3C86F9F8-2D2A-4D0A-8098-1A54311CFD56}" type="datetimeFigureOut">
               <a:rPr lang="fr-CA" smtClean="0"/>
-              <a:t>2025-11-30</a:t>
+              <a:t>2025-12-11</a:t>
             </a:fld>
             <a:endParaRPr lang="fr-CA"/>
           </a:p>
@@ -2926,7 +2934,7 @@
           <a:p>
             <a:fld id="{3C86F9F8-2D2A-4D0A-8098-1A54311CFD56}" type="datetimeFigureOut">
               <a:rPr lang="fr-CA" smtClean="0"/>
-              <a:t>2025-11-30</a:t>
+              <a:t>2025-12-11</a:t>
             </a:fld>
             <a:endParaRPr lang="fr-CA"/>
           </a:p>
@@ -3437,8 +3445,8 @@
         </p:nvSpPr>
         <p:spPr>
           <a:xfrm>
-            <a:off x="4552406" y="726803"/>
-            <a:ext cx="2579914" cy="523220"/>
+            <a:off x="409031" y="326753"/>
+            <a:ext cx="2579914" cy="400110"/>
           </a:xfrm>
           <a:prstGeom prst="rect">
             <a:avLst/>
@@ -3461,12 +3469,502 @@
           </a:bodyPr>
           <a:lstStyle/>
           <a:p>
-            <a:pPr algn="ctr"/>
-            <a:r>
-              <a:rPr lang="en-US" sz="2800" dirty="0"/>
-              <a:t>play()</a:t>
-            </a:r>
-            <a:endParaRPr lang="fr-CA" sz="2800" dirty="0"/>
+            <a:r>
+              <a:rPr lang="en-US" sz="2000" dirty="0"/>
+              <a:t>ply(…)</a:t>
+            </a:r>
+            <a:endParaRPr lang="fr-CA" sz="2000" dirty="0"/>
+          </a:p>
+        </p:txBody>
+      </p:sp>
+      <p:sp>
+        <p:nvSpPr>
+          <p:cNvPr id="2" name="TextBox 1">
+            <a:extLst>
+              <a:ext uri="{FF2B5EF4-FFF2-40B4-BE49-F238E27FC236}">
+                <a16:creationId xmlns:a16="http://schemas.microsoft.com/office/drawing/2014/main" id="{983AF324-D0CC-A0B8-A4B9-513356C879A7}"/>
+              </a:ext>
+            </a:extLst>
+          </p:cNvPr>
+          <p:cNvSpPr txBox="1"/>
+          <p:nvPr/>
+        </p:nvSpPr>
+        <p:spPr>
+          <a:xfrm>
+            <a:off x="1038362" y="924447"/>
+            <a:ext cx="2579914" cy="400110"/>
+          </a:xfrm>
+          <a:prstGeom prst="rect">
+            <a:avLst/>
+          </a:prstGeom>
+          <a:solidFill>
+            <a:schemeClr val="accent6">
+              <a:lumMod val="60000"/>
+              <a:lumOff val="40000"/>
+            </a:schemeClr>
+          </a:solidFill>
+          <a:ln>
+            <a:solidFill>
+              <a:schemeClr val="tx1"/>
+            </a:solidFill>
+          </a:ln>
+        </p:spPr>
+        <p:txBody>
+          <a:bodyPr wrap="square" rtlCol="0">
+            <a:spAutoFit/>
+          </a:bodyPr>
+          <a:lstStyle/>
+          <a:p>
+            <a:r>
+              <a:rPr lang="en-US" sz="2000" dirty="0"/>
+              <a:t>play(…)</a:t>
+            </a:r>
+            <a:endParaRPr lang="fr-CA" sz="2000" dirty="0"/>
+          </a:p>
+        </p:txBody>
+      </p:sp>
+      <p:sp>
+        <p:nvSpPr>
+          <p:cNvPr id="6" name="TextBox 5">
+            <a:extLst>
+              <a:ext uri="{FF2B5EF4-FFF2-40B4-BE49-F238E27FC236}">
+                <a16:creationId xmlns:a16="http://schemas.microsoft.com/office/drawing/2014/main" id="{CA6017A1-DB35-0B45-1108-AD73838DB098}"/>
+              </a:ext>
+            </a:extLst>
+          </p:cNvPr>
+          <p:cNvSpPr txBox="1"/>
+          <p:nvPr/>
+        </p:nvSpPr>
+        <p:spPr>
+          <a:xfrm>
+            <a:off x="2071144" y="1522141"/>
+            <a:ext cx="2579914" cy="400110"/>
+          </a:xfrm>
+          <a:prstGeom prst="rect">
+            <a:avLst/>
+          </a:prstGeom>
+          <a:solidFill>
+            <a:schemeClr val="tx2">
+              <a:lumMod val="50000"/>
+              <a:lumOff val="50000"/>
+            </a:schemeClr>
+          </a:solidFill>
+          <a:ln>
+            <a:solidFill>
+              <a:schemeClr val="tx1"/>
+            </a:solidFill>
+          </a:ln>
+        </p:spPr>
+        <p:txBody>
+          <a:bodyPr wrap="square" rtlCol="0">
+            <a:spAutoFit/>
+          </a:bodyPr>
+          <a:lstStyle/>
+          <a:p>
+            <a:r>
+              <a:rPr lang="fr-CA" sz="2000" dirty="0" err="1"/>
+              <a:t>is_move_valid</a:t>
+            </a:r>
+            <a:r>
+              <a:rPr lang="en-US" sz="2000" dirty="0"/>
+              <a:t>(…)</a:t>
+            </a:r>
+            <a:endParaRPr lang="fr-CA" sz="2000" dirty="0"/>
+          </a:p>
+        </p:txBody>
+      </p:sp>
+      <p:sp>
+        <p:nvSpPr>
+          <p:cNvPr id="7" name="TextBox 6">
+            <a:extLst>
+              <a:ext uri="{FF2B5EF4-FFF2-40B4-BE49-F238E27FC236}">
+                <a16:creationId xmlns:a16="http://schemas.microsoft.com/office/drawing/2014/main" id="{AC50E18E-FD5C-F6AF-4604-4FE030C0ACCC}"/>
+              </a:ext>
+            </a:extLst>
+          </p:cNvPr>
+          <p:cNvSpPr txBox="1"/>
+          <p:nvPr/>
+        </p:nvSpPr>
+        <p:spPr>
+          <a:xfrm>
+            <a:off x="2071144" y="2145998"/>
+            <a:ext cx="2579914" cy="400110"/>
+          </a:xfrm>
+          <a:prstGeom prst="rect">
+            <a:avLst/>
+          </a:prstGeom>
+          <a:solidFill>
+            <a:schemeClr val="tx2">
+              <a:lumMod val="50000"/>
+              <a:lumOff val="50000"/>
+            </a:schemeClr>
+          </a:solidFill>
+          <a:ln>
+            <a:solidFill>
+              <a:schemeClr val="tx1"/>
+            </a:solidFill>
+          </a:ln>
+        </p:spPr>
+        <p:txBody>
+          <a:bodyPr wrap="square" rtlCol="0">
+            <a:spAutoFit/>
+          </a:bodyPr>
+          <a:lstStyle/>
+          <a:p>
+            <a:r>
+              <a:rPr lang="fr-CA" sz="2000" dirty="0" err="1"/>
+              <a:t>is_atk_valid</a:t>
+            </a:r>
+            <a:r>
+              <a:rPr lang="en-US" sz="2000" dirty="0"/>
+              <a:t>(…)</a:t>
+            </a:r>
+            <a:endParaRPr lang="fr-CA" sz="2000" dirty="0"/>
+          </a:p>
+        </p:txBody>
+      </p:sp>
+      <p:sp>
+        <p:nvSpPr>
+          <p:cNvPr id="8" name="TextBox 7">
+            <a:extLst>
+              <a:ext uri="{FF2B5EF4-FFF2-40B4-BE49-F238E27FC236}">
+                <a16:creationId xmlns:a16="http://schemas.microsoft.com/office/drawing/2014/main" id="{1367F72F-7A09-FD4B-8F05-81CB78EAB53B}"/>
+              </a:ext>
+            </a:extLst>
+          </p:cNvPr>
+          <p:cNvSpPr txBox="1"/>
+          <p:nvPr/>
+        </p:nvSpPr>
+        <p:spPr>
+          <a:xfrm>
+            <a:off x="2071144" y="2891360"/>
+            <a:ext cx="2579914" cy="400110"/>
+          </a:xfrm>
+          <a:prstGeom prst="rect">
+            <a:avLst/>
+          </a:prstGeom>
+          <a:solidFill>
+            <a:schemeClr val="accent6">
+              <a:lumMod val="60000"/>
+              <a:lumOff val="40000"/>
+            </a:schemeClr>
+          </a:solidFill>
+          <a:ln>
+            <a:solidFill>
+              <a:schemeClr val="tx1"/>
+            </a:solidFill>
+          </a:ln>
+        </p:spPr>
+        <p:txBody>
+          <a:bodyPr wrap="square" rtlCol="0">
+            <a:spAutoFit/>
+          </a:bodyPr>
+          <a:lstStyle/>
+          <a:p>
+            <a:r>
+              <a:rPr lang="fr-CA" sz="2000" dirty="0" err="1"/>
+              <a:t>upd_post_play</a:t>
+            </a:r>
+            <a:r>
+              <a:rPr lang="en-US" sz="2000" dirty="0"/>
+              <a:t>(…)</a:t>
+            </a:r>
+            <a:endParaRPr lang="fr-CA" sz="2000" dirty="0"/>
+          </a:p>
+        </p:txBody>
+      </p:sp>
+      <p:sp>
+        <p:nvSpPr>
+          <p:cNvPr id="11" name="TextBox 10">
+            <a:extLst>
+              <a:ext uri="{FF2B5EF4-FFF2-40B4-BE49-F238E27FC236}">
+                <a16:creationId xmlns:a16="http://schemas.microsoft.com/office/drawing/2014/main" id="{3BBD6615-B782-B8D6-A00D-0261BBD898F6}"/>
+              </a:ext>
+            </a:extLst>
+          </p:cNvPr>
+          <p:cNvSpPr txBox="1"/>
+          <p:nvPr/>
+        </p:nvSpPr>
+        <p:spPr>
+          <a:xfrm>
+            <a:off x="1038362" y="3636722"/>
+            <a:ext cx="3051038" cy="400110"/>
+          </a:xfrm>
+          <a:prstGeom prst="rect">
+            <a:avLst/>
+          </a:prstGeom>
+          <a:solidFill>
+            <a:schemeClr val="accent6">
+              <a:lumMod val="60000"/>
+              <a:lumOff val="40000"/>
+            </a:schemeClr>
+          </a:solidFill>
+          <a:ln>
+            <a:solidFill>
+              <a:schemeClr val="tx1"/>
+            </a:solidFill>
+          </a:ln>
+        </p:spPr>
+        <p:txBody>
+          <a:bodyPr wrap="square" rtlCol="0">
+            <a:spAutoFit/>
+          </a:bodyPr>
+          <a:lstStyle/>
+          <a:p>
+            <a:r>
+              <a:rPr lang="fr-CA" sz="2000" dirty="0" err="1"/>
+              <a:t>upd_end_game_state</a:t>
+            </a:r>
+            <a:r>
+              <a:rPr lang="fr-CA" sz="2000" dirty="0"/>
+              <a:t>(…)</a:t>
+            </a:r>
+          </a:p>
+        </p:txBody>
+      </p:sp>
+      <p:sp>
+        <p:nvSpPr>
+          <p:cNvPr id="12" name="TextBox 11">
+            <a:extLst>
+              <a:ext uri="{FF2B5EF4-FFF2-40B4-BE49-F238E27FC236}">
+                <a16:creationId xmlns:a16="http://schemas.microsoft.com/office/drawing/2014/main" id="{DD88F332-19F5-6514-9776-D7C39F28FAC0}"/>
+              </a:ext>
+            </a:extLst>
+          </p:cNvPr>
+          <p:cNvSpPr txBox="1"/>
+          <p:nvPr/>
+        </p:nvSpPr>
+        <p:spPr>
+          <a:xfrm>
+            <a:off x="6219281" y="326753"/>
+            <a:ext cx="2579914" cy="400110"/>
+          </a:xfrm>
+          <a:prstGeom prst="rect">
+            <a:avLst/>
+          </a:prstGeom>
+          <a:solidFill>
+            <a:schemeClr val="accent6">
+              <a:lumMod val="60000"/>
+              <a:lumOff val="40000"/>
+            </a:schemeClr>
+          </a:solidFill>
+          <a:ln>
+            <a:solidFill>
+              <a:schemeClr val="tx1"/>
+            </a:solidFill>
+          </a:ln>
+        </p:spPr>
+        <p:txBody>
+          <a:bodyPr wrap="square" rtlCol="0">
+            <a:spAutoFit/>
+          </a:bodyPr>
+          <a:lstStyle/>
+          <a:p>
+            <a:r>
+              <a:rPr lang="fr-CA" sz="2000" dirty="0" err="1"/>
+              <a:t>ply_ag_comm</a:t>
+            </a:r>
+            <a:r>
+              <a:rPr lang="en-US" sz="2000" dirty="0"/>
+              <a:t>(…)</a:t>
+            </a:r>
+            <a:endParaRPr lang="fr-CA" sz="2000" dirty="0"/>
+          </a:p>
+        </p:txBody>
+      </p:sp>
+      <p:sp>
+        <p:nvSpPr>
+          <p:cNvPr id="13" name="TextBox 12">
+            <a:extLst>
+              <a:ext uri="{FF2B5EF4-FFF2-40B4-BE49-F238E27FC236}">
+                <a16:creationId xmlns:a16="http://schemas.microsoft.com/office/drawing/2014/main" id="{AFF4A4E3-92D2-967D-D1D7-DAA7FC2F268E}"/>
+              </a:ext>
+            </a:extLst>
+          </p:cNvPr>
+          <p:cNvSpPr txBox="1"/>
+          <p:nvPr/>
+        </p:nvSpPr>
+        <p:spPr>
+          <a:xfrm>
+            <a:off x="7152732" y="924447"/>
+            <a:ext cx="2579914" cy="400110"/>
+          </a:xfrm>
+          <a:prstGeom prst="rect">
+            <a:avLst/>
+          </a:prstGeom>
+          <a:solidFill>
+            <a:schemeClr val="tx2">
+              <a:lumMod val="50000"/>
+              <a:lumOff val="50000"/>
+            </a:schemeClr>
+          </a:solidFill>
+          <a:ln>
+            <a:solidFill>
+              <a:schemeClr val="tx1"/>
+            </a:solidFill>
+          </a:ln>
+        </p:spPr>
+        <p:txBody>
+          <a:bodyPr wrap="square" rtlCol="0">
+            <a:spAutoFit/>
+          </a:bodyPr>
+          <a:lstStyle/>
+          <a:p>
+            <a:r>
+              <a:rPr lang="fr-CA" sz="2000" dirty="0" err="1"/>
+              <a:t>is_atk_valid</a:t>
+            </a:r>
+            <a:r>
+              <a:rPr lang="en-US" sz="2000" dirty="0"/>
+              <a:t>(…)</a:t>
+            </a:r>
+            <a:endParaRPr lang="fr-CA" sz="2000" dirty="0"/>
+          </a:p>
+        </p:txBody>
+      </p:sp>
+      <p:sp>
+        <p:nvSpPr>
+          <p:cNvPr id="14" name="TextBox 13">
+            <a:extLst>
+              <a:ext uri="{FF2B5EF4-FFF2-40B4-BE49-F238E27FC236}">
+                <a16:creationId xmlns:a16="http://schemas.microsoft.com/office/drawing/2014/main" id="{8C67BB04-9E69-1609-9B01-2214E1E82534}"/>
+              </a:ext>
+            </a:extLst>
+          </p:cNvPr>
+          <p:cNvSpPr txBox="1"/>
+          <p:nvPr/>
+        </p:nvSpPr>
+        <p:spPr>
+          <a:xfrm>
+            <a:off x="7152732" y="1522141"/>
+            <a:ext cx="2579914" cy="400110"/>
+          </a:xfrm>
+          <a:prstGeom prst="rect">
+            <a:avLst/>
+          </a:prstGeom>
+          <a:solidFill>
+            <a:schemeClr val="tx2">
+              <a:lumMod val="50000"/>
+              <a:lumOff val="50000"/>
+            </a:schemeClr>
+          </a:solidFill>
+          <a:ln>
+            <a:solidFill>
+              <a:schemeClr val="tx1"/>
+            </a:solidFill>
+          </a:ln>
+        </p:spPr>
+        <p:txBody>
+          <a:bodyPr wrap="square" rtlCol="0">
+            <a:spAutoFit/>
+          </a:bodyPr>
+          <a:lstStyle/>
+          <a:p>
+            <a:r>
+              <a:rPr lang="fr-CA" sz="2000" dirty="0" err="1"/>
+              <a:t>is_move_valid</a:t>
+            </a:r>
+            <a:r>
+              <a:rPr lang="en-US" sz="2000" dirty="0"/>
+              <a:t>(…)</a:t>
+            </a:r>
+            <a:endParaRPr lang="fr-CA" sz="2000" dirty="0"/>
+          </a:p>
+        </p:txBody>
+      </p:sp>
+      <p:sp>
+        <p:nvSpPr>
+          <p:cNvPr id="15" name="TextBox 14">
+            <a:extLst>
+              <a:ext uri="{FF2B5EF4-FFF2-40B4-BE49-F238E27FC236}">
+                <a16:creationId xmlns:a16="http://schemas.microsoft.com/office/drawing/2014/main" id="{813C98B4-7696-AA0E-9B30-332C49B37935}"/>
+              </a:ext>
+            </a:extLst>
+          </p:cNvPr>
+          <p:cNvSpPr txBox="1"/>
+          <p:nvPr/>
+        </p:nvSpPr>
+        <p:spPr>
+          <a:xfrm>
+            <a:off x="7152732" y="2119835"/>
+            <a:ext cx="2579914" cy="400110"/>
+          </a:xfrm>
+          <a:prstGeom prst="rect">
+            <a:avLst/>
+          </a:prstGeom>
+          <a:solidFill>
+            <a:schemeClr val="accent6">
+              <a:lumMod val="60000"/>
+              <a:lumOff val="40000"/>
+            </a:schemeClr>
+          </a:solidFill>
+          <a:ln>
+            <a:solidFill>
+              <a:schemeClr val="tx1"/>
+            </a:solidFill>
+          </a:ln>
+        </p:spPr>
+        <p:txBody>
+          <a:bodyPr wrap="square" rtlCol="0">
+            <a:spAutoFit/>
+          </a:bodyPr>
+          <a:lstStyle/>
+          <a:p>
+            <a:r>
+              <a:rPr lang="en-US" sz="2000" dirty="0"/>
+              <a:t>ply(…)</a:t>
+            </a:r>
+            <a:endParaRPr lang="fr-CA" sz="2000" dirty="0"/>
+          </a:p>
+        </p:txBody>
+      </p:sp>
+      <p:sp>
+        <p:nvSpPr>
+          <p:cNvPr id="16" name="TextBox 15">
+            <a:extLst>
+              <a:ext uri="{FF2B5EF4-FFF2-40B4-BE49-F238E27FC236}">
+                <a16:creationId xmlns:a16="http://schemas.microsoft.com/office/drawing/2014/main" id="{56035D07-1A38-723A-2F87-FA7248A87DB5}"/>
+              </a:ext>
+            </a:extLst>
+          </p:cNvPr>
+          <p:cNvSpPr txBox="1"/>
+          <p:nvPr/>
+        </p:nvSpPr>
+        <p:spPr>
+          <a:xfrm>
+            <a:off x="7152732" y="2717529"/>
+            <a:ext cx="2579914" cy="400110"/>
+          </a:xfrm>
+          <a:prstGeom prst="rect">
+            <a:avLst/>
+          </a:prstGeom>
+          <a:solidFill>
+            <a:schemeClr val="accent6">
+              <a:lumMod val="60000"/>
+              <a:lumOff val="40000"/>
+            </a:schemeClr>
+          </a:solidFill>
+          <a:ln>
+            <a:solidFill>
+              <a:schemeClr val="tx1"/>
+            </a:solidFill>
+          </a:ln>
+        </p:spPr>
+        <p:txBody>
+          <a:bodyPr wrap="square" rtlCol="0">
+            <a:spAutoFit/>
+          </a:bodyPr>
+          <a:lstStyle/>
+          <a:p>
+            <a:r>
+              <a:rPr lang="fr-CA" sz="2000" dirty="0" err="1"/>
+              <a:t>promote</a:t>
+            </a:r>
+            <a:r>
+              <a:rPr lang="en-US" sz="2000" dirty="0"/>
+              <a:t>(…)</a:t>
+            </a:r>
+            <a:endParaRPr lang="fr-CA" sz="2000" dirty="0"/>
           </a:p>
         </p:txBody>
       </p:sp>
@@ -3474,6 +3972,1933 @@
     <p:extLst>
       <p:ext uri="{BB962C8B-B14F-4D97-AF65-F5344CB8AC3E}">
         <p14:creationId xmlns:p14="http://schemas.microsoft.com/office/powerpoint/2010/main" val="1840652513"/>
+      </p:ext>
+    </p:extLst>
+  </p:cSld>
+  <p:clrMapOvr>
+    <a:masterClrMapping/>
+  </p:clrMapOvr>
+</p:sld>
+</file>
+
+<file path=ppt/slides/slide3.xml><?xml version="1.0" encoding="utf-8"?>
+<p:sld xmlns:a="http://schemas.openxmlformats.org/drawingml/2006/main" xmlns:r="http://schemas.openxmlformats.org/officeDocument/2006/relationships" xmlns:p="http://schemas.openxmlformats.org/presentationml/2006/main">
+  <p:cSld>
+    <p:spTree>
+      <p:nvGrpSpPr>
+        <p:cNvPr id="1" name=""/>
+        <p:cNvGrpSpPr/>
+        <p:nvPr/>
+      </p:nvGrpSpPr>
+      <p:grpSpPr>
+        <a:xfrm>
+          <a:off x="0" y="0"/>
+          <a:ext cx="0" cy="0"/>
+          <a:chOff x="0" y="0"/>
+          <a:chExt cx="0" cy="0"/>
+        </a:xfrm>
+      </p:grpSpPr>
+      <p:sp>
+        <p:nvSpPr>
+          <p:cNvPr id="4" name="TextBox 3">
+            <a:extLst>
+              <a:ext uri="{FF2B5EF4-FFF2-40B4-BE49-F238E27FC236}">
+                <a16:creationId xmlns:a16="http://schemas.microsoft.com/office/drawing/2014/main" id="{4768A9A4-5E7C-52BB-5F2F-97E6384C150F}"/>
+              </a:ext>
+            </a:extLst>
+          </p:cNvPr>
+          <p:cNvSpPr txBox="1"/>
+          <p:nvPr/>
+        </p:nvSpPr>
+        <p:spPr>
+          <a:xfrm>
+            <a:off x="783681" y="758553"/>
+            <a:ext cx="2579914" cy="400110"/>
+          </a:xfrm>
+          <a:prstGeom prst="rect">
+            <a:avLst/>
+          </a:prstGeom>
+          <a:solidFill>
+            <a:schemeClr val="accent6">
+              <a:lumMod val="60000"/>
+              <a:lumOff val="40000"/>
+            </a:schemeClr>
+          </a:solidFill>
+          <a:ln>
+            <a:solidFill>
+              <a:schemeClr val="tx1"/>
+            </a:solidFill>
+          </a:ln>
+        </p:spPr>
+        <p:txBody>
+          <a:bodyPr wrap="square" rtlCol="0">
+            <a:spAutoFit/>
+          </a:bodyPr>
+          <a:lstStyle/>
+          <a:p>
+            <a:r>
+              <a:rPr lang="fr-CA" sz="2000" dirty="0" err="1"/>
+              <a:t>minmaxAB_loop</a:t>
+            </a:r>
+            <a:r>
+              <a:rPr lang="en-US" sz="2000" dirty="0"/>
+              <a:t>(…)</a:t>
+            </a:r>
+            <a:endParaRPr lang="fr-CA" sz="2000" dirty="0"/>
+          </a:p>
+        </p:txBody>
+      </p:sp>
+      <p:sp>
+        <p:nvSpPr>
+          <p:cNvPr id="5" name="TextBox 4">
+            <a:extLst>
+              <a:ext uri="{FF2B5EF4-FFF2-40B4-BE49-F238E27FC236}">
+                <a16:creationId xmlns:a16="http://schemas.microsoft.com/office/drawing/2014/main" id="{4ACBE48D-3AA1-31E0-466F-BB8931BE6963}"/>
+              </a:ext>
+            </a:extLst>
+          </p:cNvPr>
+          <p:cNvSpPr txBox="1"/>
+          <p:nvPr/>
+        </p:nvSpPr>
+        <p:spPr>
+          <a:xfrm>
+            <a:off x="1342481" y="1520553"/>
+            <a:ext cx="2579914" cy="400110"/>
+          </a:xfrm>
+          <a:prstGeom prst="rect">
+            <a:avLst/>
+          </a:prstGeom>
+          <a:solidFill>
+            <a:schemeClr val="accent6">
+              <a:lumMod val="60000"/>
+              <a:lumOff val="40000"/>
+            </a:schemeClr>
+          </a:solidFill>
+          <a:ln>
+            <a:solidFill>
+              <a:schemeClr val="tx1"/>
+            </a:solidFill>
+          </a:ln>
+        </p:spPr>
+        <p:txBody>
+          <a:bodyPr wrap="square" rtlCol="0">
+            <a:spAutoFit/>
+          </a:bodyPr>
+          <a:lstStyle/>
+          <a:p>
+            <a:r>
+              <a:rPr lang="fr-CA" sz="2000" dirty="0" err="1"/>
+              <a:t>gameStateEval</a:t>
+            </a:r>
+            <a:r>
+              <a:rPr lang="en-US" sz="2000" dirty="0"/>
+              <a:t>(…)</a:t>
+            </a:r>
+            <a:endParaRPr lang="fr-CA" sz="2000" dirty="0"/>
+          </a:p>
+        </p:txBody>
+      </p:sp>
+      <p:sp>
+        <p:nvSpPr>
+          <p:cNvPr id="6" name="TextBox 5">
+            <a:extLst>
+              <a:ext uri="{FF2B5EF4-FFF2-40B4-BE49-F238E27FC236}">
+                <a16:creationId xmlns:a16="http://schemas.microsoft.com/office/drawing/2014/main" id="{F8B933B0-5B02-23F4-86EE-C722E2E6E045}"/>
+              </a:ext>
+            </a:extLst>
+          </p:cNvPr>
+          <p:cNvSpPr txBox="1"/>
+          <p:nvPr/>
+        </p:nvSpPr>
+        <p:spPr>
+          <a:xfrm>
+            <a:off x="1342481" y="1982470"/>
+            <a:ext cx="3371124" cy="400110"/>
+          </a:xfrm>
+          <a:prstGeom prst="rect">
+            <a:avLst/>
+          </a:prstGeom>
+          <a:solidFill>
+            <a:schemeClr val="accent6">
+              <a:lumMod val="60000"/>
+              <a:lumOff val="40000"/>
+            </a:schemeClr>
+          </a:solidFill>
+          <a:ln>
+            <a:solidFill>
+              <a:schemeClr val="tx1"/>
+            </a:solidFill>
+          </a:ln>
+        </p:spPr>
+        <p:txBody>
+          <a:bodyPr wrap="square" rtlCol="0">
+            <a:spAutoFit/>
+          </a:bodyPr>
+          <a:lstStyle/>
+          <a:p>
+            <a:r>
+              <a:rPr lang="en-CA" sz="2000" dirty="0" err="1"/>
+              <a:t>get_all_psbl_alg_comm</a:t>
+            </a:r>
+            <a:r>
+              <a:rPr lang="en-US" sz="2000" dirty="0"/>
+              <a:t>(…)</a:t>
+            </a:r>
+            <a:endParaRPr lang="fr-CA" sz="2000" dirty="0"/>
+          </a:p>
+        </p:txBody>
+      </p:sp>
+      <p:sp>
+        <p:nvSpPr>
+          <p:cNvPr id="8" name="TextBox 7">
+            <a:extLst>
+              <a:ext uri="{FF2B5EF4-FFF2-40B4-BE49-F238E27FC236}">
+                <a16:creationId xmlns:a16="http://schemas.microsoft.com/office/drawing/2014/main" id="{05B21085-6B51-7D76-BED9-4AB9417338D0}"/>
+              </a:ext>
+            </a:extLst>
+          </p:cNvPr>
+          <p:cNvSpPr txBox="1"/>
+          <p:nvPr/>
+        </p:nvSpPr>
+        <p:spPr>
+          <a:xfrm>
+            <a:off x="1342481" y="2451100"/>
+            <a:ext cx="3371124" cy="400110"/>
+          </a:xfrm>
+          <a:prstGeom prst="rect">
+            <a:avLst/>
+          </a:prstGeom>
+          <a:solidFill>
+            <a:schemeClr val="accent6">
+              <a:lumMod val="60000"/>
+              <a:lumOff val="40000"/>
+            </a:schemeClr>
+          </a:solidFill>
+          <a:ln>
+            <a:solidFill>
+              <a:schemeClr val="tx1"/>
+            </a:solidFill>
+          </a:ln>
+        </p:spPr>
+        <p:txBody>
+          <a:bodyPr wrap="square" rtlCol="0">
+            <a:spAutoFit/>
+          </a:bodyPr>
+          <a:lstStyle/>
+          <a:p>
+            <a:r>
+              <a:rPr lang="fr-CA" sz="2000" dirty="0" err="1"/>
+              <a:t>ply_ag_comm</a:t>
+            </a:r>
+            <a:r>
+              <a:rPr lang="en-US" sz="2000" dirty="0"/>
+              <a:t>(…)</a:t>
+            </a:r>
+            <a:endParaRPr lang="fr-CA" sz="2000" dirty="0"/>
+          </a:p>
+        </p:txBody>
+      </p:sp>
+      <p:sp>
+        <p:nvSpPr>
+          <p:cNvPr id="9" name="TextBox 8">
+            <a:extLst>
+              <a:ext uri="{FF2B5EF4-FFF2-40B4-BE49-F238E27FC236}">
+                <a16:creationId xmlns:a16="http://schemas.microsoft.com/office/drawing/2014/main" id="{B3C309F9-76AC-5FBB-DD11-BFAA692D3C74}"/>
+              </a:ext>
+            </a:extLst>
+          </p:cNvPr>
+          <p:cNvSpPr txBox="1"/>
+          <p:nvPr/>
+        </p:nvSpPr>
+        <p:spPr>
+          <a:xfrm>
+            <a:off x="1342481" y="2919730"/>
+            <a:ext cx="2579914" cy="400110"/>
+          </a:xfrm>
+          <a:prstGeom prst="rect">
+            <a:avLst/>
+          </a:prstGeom>
+          <a:solidFill>
+            <a:schemeClr val="accent6">
+              <a:lumMod val="60000"/>
+              <a:lumOff val="40000"/>
+            </a:schemeClr>
+          </a:solidFill>
+          <a:ln>
+            <a:solidFill>
+              <a:schemeClr val="tx1"/>
+            </a:solidFill>
+          </a:ln>
+        </p:spPr>
+        <p:txBody>
+          <a:bodyPr wrap="square" rtlCol="0">
+            <a:spAutoFit/>
+          </a:bodyPr>
+          <a:lstStyle/>
+          <a:p>
+            <a:r>
+              <a:rPr lang="fr-CA" sz="2000" dirty="0" err="1"/>
+              <a:t>minmaxAB_loop</a:t>
+            </a:r>
+            <a:r>
+              <a:rPr lang="en-US" sz="2000" dirty="0"/>
+              <a:t>(…)</a:t>
+            </a:r>
+            <a:endParaRPr lang="fr-CA" sz="2000" dirty="0"/>
+          </a:p>
+        </p:txBody>
+      </p:sp>
+      <p:sp>
+        <p:nvSpPr>
+          <p:cNvPr id="10" name="TextBox 9">
+            <a:extLst>
+              <a:ext uri="{FF2B5EF4-FFF2-40B4-BE49-F238E27FC236}">
+                <a16:creationId xmlns:a16="http://schemas.microsoft.com/office/drawing/2014/main" id="{048B11B7-2248-E08E-9703-A00F215811AB}"/>
+              </a:ext>
+            </a:extLst>
+          </p:cNvPr>
+          <p:cNvSpPr txBox="1"/>
+          <p:nvPr/>
+        </p:nvSpPr>
+        <p:spPr>
+          <a:xfrm>
+            <a:off x="6371681" y="790061"/>
+            <a:ext cx="3371124" cy="400110"/>
+          </a:xfrm>
+          <a:prstGeom prst="rect">
+            <a:avLst/>
+          </a:prstGeom>
+          <a:solidFill>
+            <a:schemeClr val="accent6">
+              <a:lumMod val="60000"/>
+              <a:lumOff val="40000"/>
+            </a:schemeClr>
+          </a:solidFill>
+          <a:ln>
+            <a:solidFill>
+              <a:schemeClr val="tx1"/>
+            </a:solidFill>
+          </a:ln>
+        </p:spPr>
+        <p:txBody>
+          <a:bodyPr wrap="square" rtlCol="0">
+            <a:spAutoFit/>
+          </a:bodyPr>
+          <a:lstStyle/>
+          <a:p>
+            <a:r>
+              <a:rPr lang="en-CA" sz="2000" dirty="0" err="1"/>
+              <a:t>get_all_psbl_alg_comm</a:t>
+            </a:r>
+            <a:r>
+              <a:rPr lang="en-US" sz="2000" dirty="0"/>
+              <a:t>(…)</a:t>
+            </a:r>
+            <a:endParaRPr lang="fr-CA" sz="2000" dirty="0"/>
+          </a:p>
+        </p:txBody>
+      </p:sp>
+      <p:sp>
+        <p:nvSpPr>
+          <p:cNvPr id="11" name="TextBox 10">
+            <a:extLst>
+              <a:ext uri="{FF2B5EF4-FFF2-40B4-BE49-F238E27FC236}">
+                <a16:creationId xmlns:a16="http://schemas.microsoft.com/office/drawing/2014/main" id="{A507AB53-E0BC-C63B-0E82-0A6A73688EF7}"/>
+              </a:ext>
+            </a:extLst>
+          </p:cNvPr>
+          <p:cNvSpPr txBox="1"/>
+          <p:nvPr/>
+        </p:nvSpPr>
+        <p:spPr>
+          <a:xfrm>
+            <a:off x="7070181" y="1520553"/>
+            <a:ext cx="3371124" cy="400110"/>
+          </a:xfrm>
+          <a:prstGeom prst="rect">
+            <a:avLst/>
+          </a:prstGeom>
+          <a:solidFill>
+            <a:schemeClr val="accent6">
+              <a:lumMod val="60000"/>
+              <a:lumOff val="40000"/>
+            </a:schemeClr>
+          </a:solidFill>
+          <a:ln>
+            <a:solidFill>
+              <a:schemeClr val="tx1"/>
+            </a:solidFill>
+          </a:ln>
+        </p:spPr>
+        <p:txBody>
+          <a:bodyPr wrap="square" rtlCol="0">
+            <a:spAutoFit/>
+          </a:bodyPr>
+          <a:lstStyle/>
+          <a:p>
+            <a:r>
+              <a:rPr lang="fr-CA" sz="2000" dirty="0" err="1"/>
+              <a:t>get_all_valid_atks</a:t>
+            </a:r>
+            <a:r>
+              <a:rPr lang="en-US" sz="2000" dirty="0"/>
+              <a:t>(…)</a:t>
+            </a:r>
+            <a:endParaRPr lang="fr-CA" sz="2000" dirty="0"/>
+          </a:p>
+        </p:txBody>
+      </p:sp>
+      <p:sp>
+        <p:nvSpPr>
+          <p:cNvPr id="12" name="TextBox 11">
+            <a:extLst>
+              <a:ext uri="{FF2B5EF4-FFF2-40B4-BE49-F238E27FC236}">
+                <a16:creationId xmlns:a16="http://schemas.microsoft.com/office/drawing/2014/main" id="{5940B7DC-0D53-0F6D-3CC4-6F2014E7ABAD}"/>
+              </a:ext>
+            </a:extLst>
+          </p:cNvPr>
+          <p:cNvSpPr txBox="1"/>
+          <p:nvPr/>
+        </p:nvSpPr>
+        <p:spPr>
+          <a:xfrm>
+            <a:off x="7070181" y="2050990"/>
+            <a:ext cx="3371124" cy="400110"/>
+          </a:xfrm>
+          <a:prstGeom prst="rect">
+            <a:avLst/>
+          </a:prstGeom>
+          <a:solidFill>
+            <a:schemeClr val="accent6">
+              <a:lumMod val="60000"/>
+              <a:lumOff val="40000"/>
+            </a:schemeClr>
+          </a:solidFill>
+          <a:ln>
+            <a:solidFill>
+              <a:schemeClr val="tx1"/>
+            </a:solidFill>
+          </a:ln>
+        </p:spPr>
+        <p:txBody>
+          <a:bodyPr wrap="square" rtlCol="0">
+            <a:spAutoFit/>
+          </a:bodyPr>
+          <a:lstStyle/>
+          <a:p>
+            <a:r>
+              <a:rPr lang="fr-CA" sz="2000" dirty="0" err="1"/>
+              <a:t>get_all_valid_moves</a:t>
+            </a:r>
+            <a:r>
+              <a:rPr lang="en-US" sz="2000" dirty="0"/>
+              <a:t>(…)</a:t>
+            </a:r>
+            <a:endParaRPr lang="fr-CA" sz="2000" dirty="0"/>
+          </a:p>
+        </p:txBody>
+      </p:sp>
+    </p:spTree>
+    <p:extLst>
+      <p:ext uri="{BB962C8B-B14F-4D97-AF65-F5344CB8AC3E}">
+        <p14:creationId xmlns:p14="http://schemas.microsoft.com/office/powerpoint/2010/main" val="3808629335"/>
+      </p:ext>
+    </p:extLst>
+  </p:cSld>
+  <p:clrMapOvr>
+    <a:masterClrMapping/>
+  </p:clrMapOvr>
+</p:sld>
+</file>
+
+<file path=ppt/slides/slide4.xml><?xml version="1.0" encoding="utf-8"?>
+<p:sld xmlns:a="http://schemas.openxmlformats.org/drawingml/2006/main" xmlns:r="http://schemas.openxmlformats.org/officeDocument/2006/relationships" xmlns:p="http://schemas.openxmlformats.org/presentationml/2006/main">
+  <p:cSld>
+    <p:spTree>
+      <p:nvGrpSpPr>
+        <p:cNvPr id="1" name=""/>
+        <p:cNvGrpSpPr/>
+        <p:nvPr/>
+      </p:nvGrpSpPr>
+      <p:grpSpPr>
+        <a:xfrm>
+          <a:off x="0" y="0"/>
+          <a:ext cx="0" cy="0"/>
+          <a:chOff x="0" y="0"/>
+          <a:chExt cx="0" cy="0"/>
+        </a:xfrm>
+      </p:grpSpPr>
+      <p:sp>
+        <p:nvSpPr>
+          <p:cNvPr id="4" name="TextBox 3">
+            <a:extLst>
+              <a:ext uri="{FF2B5EF4-FFF2-40B4-BE49-F238E27FC236}">
+                <a16:creationId xmlns:a16="http://schemas.microsoft.com/office/drawing/2014/main" id="{830F5EC1-57B5-9246-02CB-A210372CC966}"/>
+              </a:ext>
+            </a:extLst>
+          </p:cNvPr>
+          <p:cNvSpPr txBox="1"/>
+          <p:nvPr/>
+        </p:nvSpPr>
+        <p:spPr>
+          <a:xfrm>
+            <a:off x="542381" y="504553"/>
+            <a:ext cx="3371124" cy="400110"/>
+          </a:xfrm>
+          <a:prstGeom prst="rect">
+            <a:avLst/>
+          </a:prstGeom>
+          <a:solidFill>
+            <a:schemeClr val="accent6">
+              <a:lumMod val="60000"/>
+              <a:lumOff val="40000"/>
+            </a:schemeClr>
+          </a:solidFill>
+          <a:ln>
+            <a:solidFill>
+              <a:schemeClr val="tx1"/>
+            </a:solidFill>
+          </a:ln>
+        </p:spPr>
+        <p:txBody>
+          <a:bodyPr wrap="square" rtlCol="0">
+            <a:spAutoFit/>
+          </a:bodyPr>
+          <a:lstStyle/>
+          <a:p>
+            <a:r>
+              <a:rPr lang="fr-CA" sz="2000" dirty="0" err="1"/>
+              <a:t>get_all_valid_atks</a:t>
+            </a:r>
+            <a:r>
+              <a:rPr lang="en-US" sz="2000" dirty="0"/>
+              <a:t>(…)</a:t>
+            </a:r>
+            <a:endParaRPr lang="fr-CA" sz="2000" dirty="0"/>
+          </a:p>
+        </p:txBody>
+      </p:sp>
+      <p:sp>
+        <p:nvSpPr>
+          <p:cNvPr id="5" name="TextBox 4">
+            <a:extLst>
+              <a:ext uri="{FF2B5EF4-FFF2-40B4-BE49-F238E27FC236}">
+                <a16:creationId xmlns:a16="http://schemas.microsoft.com/office/drawing/2014/main" id="{50884EFB-70E0-F5CC-298A-14736D77F940}"/>
+              </a:ext>
+            </a:extLst>
+          </p:cNvPr>
+          <p:cNvSpPr txBox="1"/>
+          <p:nvPr/>
+        </p:nvSpPr>
+        <p:spPr>
+          <a:xfrm>
+            <a:off x="1088481" y="1190353"/>
+            <a:ext cx="3371124" cy="400110"/>
+          </a:xfrm>
+          <a:prstGeom prst="rect">
+            <a:avLst/>
+          </a:prstGeom>
+          <a:solidFill>
+            <a:schemeClr val="accent6">
+              <a:lumMod val="60000"/>
+              <a:lumOff val="40000"/>
+            </a:schemeClr>
+          </a:solidFill>
+          <a:ln>
+            <a:solidFill>
+              <a:schemeClr val="tx1"/>
+            </a:solidFill>
+          </a:ln>
+        </p:spPr>
+        <p:txBody>
+          <a:bodyPr wrap="square" rtlCol="0">
+            <a:spAutoFit/>
+          </a:bodyPr>
+          <a:lstStyle/>
+          <a:p>
+            <a:r>
+              <a:rPr lang="en-CA" sz="2000" dirty="0" err="1"/>
+              <a:t>get_all_valid_atk_sq</a:t>
+            </a:r>
+            <a:r>
+              <a:rPr lang="en-US" sz="2000" dirty="0"/>
+              <a:t>(…)</a:t>
+            </a:r>
+            <a:endParaRPr lang="fr-CA" sz="2000" dirty="0"/>
+          </a:p>
+        </p:txBody>
+      </p:sp>
+      <p:sp>
+        <p:nvSpPr>
+          <p:cNvPr id="6" name="TextBox 5">
+            <a:extLst>
+              <a:ext uri="{FF2B5EF4-FFF2-40B4-BE49-F238E27FC236}">
+                <a16:creationId xmlns:a16="http://schemas.microsoft.com/office/drawing/2014/main" id="{7C52D0C9-ECF6-06F7-D75B-C7F1F9D8655D}"/>
+              </a:ext>
+            </a:extLst>
+          </p:cNvPr>
+          <p:cNvSpPr txBox="1"/>
+          <p:nvPr/>
+        </p:nvSpPr>
+        <p:spPr>
+          <a:xfrm>
+            <a:off x="440781" y="3914745"/>
+            <a:ext cx="3371124" cy="400110"/>
+          </a:xfrm>
+          <a:prstGeom prst="rect">
+            <a:avLst/>
+          </a:prstGeom>
+          <a:solidFill>
+            <a:schemeClr val="accent6">
+              <a:lumMod val="60000"/>
+              <a:lumOff val="40000"/>
+            </a:schemeClr>
+          </a:solidFill>
+          <a:ln>
+            <a:solidFill>
+              <a:schemeClr val="tx1"/>
+            </a:solidFill>
+          </a:ln>
+        </p:spPr>
+        <p:txBody>
+          <a:bodyPr wrap="square" rtlCol="0">
+            <a:spAutoFit/>
+          </a:bodyPr>
+          <a:lstStyle/>
+          <a:p>
+            <a:r>
+              <a:rPr lang="fr-CA" sz="2000" dirty="0" err="1"/>
+              <a:t>get_all_valid_moves</a:t>
+            </a:r>
+            <a:r>
+              <a:rPr lang="en-US" sz="2000" dirty="0"/>
+              <a:t>(…)</a:t>
+            </a:r>
+            <a:endParaRPr lang="fr-CA" sz="2000" dirty="0"/>
+          </a:p>
+        </p:txBody>
+      </p:sp>
+      <p:sp>
+        <p:nvSpPr>
+          <p:cNvPr id="7" name="TextBox 6">
+            <a:extLst>
+              <a:ext uri="{FF2B5EF4-FFF2-40B4-BE49-F238E27FC236}">
+                <a16:creationId xmlns:a16="http://schemas.microsoft.com/office/drawing/2014/main" id="{1550B1D8-6569-01C4-AB17-00BAECE6E637}"/>
+              </a:ext>
+            </a:extLst>
+          </p:cNvPr>
+          <p:cNvSpPr txBox="1"/>
+          <p:nvPr/>
+        </p:nvSpPr>
+        <p:spPr>
+          <a:xfrm>
+            <a:off x="809081" y="4400490"/>
+            <a:ext cx="3371124" cy="400110"/>
+          </a:xfrm>
+          <a:prstGeom prst="rect">
+            <a:avLst/>
+          </a:prstGeom>
+          <a:solidFill>
+            <a:schemeClr val="accent6">
+              <a:lumMod val="60000"/>
+              <a:lumOff val="40000"/>
+            </a:schemeClr>
+          </a:solidFill>
+          <a:ln>
+            <a:solidFill>
+              <a:schemeClr val="tx1"/>
+            </a:solidFill>
+          </a:ln>
+        </p:spPr>
+        <p:txBody>
+          <a:bodyPr wrap="square" rtlCol="0">
+            <a:spAutoFit/>
+          </a:bodyPr>
+          <a:lstStyle/>
+          <a:p>
+            <a:r>
+              <a:rPr lang="en-CA" sz="2000" dirty="0" err="1"/>
+              <a:t>get_all_valid_move_sq</a:t>
+            </a:r>
+            <a:r>
+              <a:rPr lang="en-US" sz="2000" dirty="0"/>
+              <a:t>(…)</a:t>
+            </a:r>
+            <a:endParaRPr lang="fr-CA" sz="2000" dirty="0"/>
+          </a:p>
+        </p:txBody>
+      </p:sp>
+      <p:sp>
+        <p:nvSpPr>
+          <p:cNvPr id="8" name="TextBox 7">
+            <a:extLst>
+              <a:ext uri="{FF2B5EF4-FFF2-40B4-BE49-F238E27FC236}">
+                <a16:creationId xmlns:a16="http://schemas.microsoft.com/office/drawing/2014/main" id="{1BD1AF04-7B1F-326E-6CF8-B68D78D74015}"/>
+              </a:ext>
+            </a:extLst>
+          </p:cNvPr>
+          <p:cNvSpPr txBox="1"/>
+          <p:nvPr/>
+        </p:nvSpPr>
+        <p:spPr>
+          <a:xfrm>
+            <a:off x="1444081" y="1876153"/>
+            <a:ext cx="3371124" cy="400110"/>
+          </a:xfrm>
+          <a:prstGeom prst="rect">
+            <a:avLst/>
+          </a:prstGeom>
+          <a:solidFill>
+            <a:schemeClr val="accent6">
+              <a:lumMod val="60000"/>
+              <a:lumOff val="40000"/>
+            </a:schemeClr>
+          </a:solidFill>
+          <a:ln>
+            <a:solidFill>
+              <a:schemeClr val="tx1"/>
+            </a:solidFill>
+          </a:ln>
+        </p:spPr>
+        <p:txBody>
+          <a:bodyPr wrap="square" rtlCol="0">
+            <a:spAutoFit/>
+          </a:bodyPr>
+          <a:lstStyle/>
+          <a:p>
+            <a:r>
+              <a:rPr lang="fr-CA" sz="2000" dirty="0" err="1"/>
+              <a:t>get_all_atk_sq</a:t>
+            </a:r>
+            <a:r>
+              <a:rPr lang="en-US" sz="2000" dirty="0"/>
+              <a:t>(…)</a:t>
+            </a:r>
+            <a:endParaRPr lang="fr-CA" sz="2000" dirty="0"/>
+          </a:p>
+        </p:txBody>
+      </p:sp>
+      <p:sp>
+        <p:nvSpPr>
+          <p:cNvPr id="9" name="TextBox 8">
+            <a:extLst>
+              <a:ext uri="{FF2B5EF4-FFF2-40B4-BE49-F238E27FC236}">
+                <a16:creationId xmlns:a16="http://schemas.microsoft.com/office/drawing/2014/main" id="{5F67B502-F333-1AB6-A1E9-86A98A6ADC78}"/>
+              </a:ext>
+            </a:extLst>
+          </p:cNvPr>
+          <p:cNvSpPr txBox="1"/>
+          <p:nvPr/>
+        </p:nvSpPr>
+        <p:spPr>
+          <a:xfrm>
+            <a:off x="1266281" y="4829144"/>
+            <a:ext cx="3371124" cy="400110"/>
+          </a:xfrm>
+          <a:prstGeom prst="rect">
+            <a:avLst/>
+          </a:prstGeom>
+          <a:solidFill>
+            <a:schemeClr val="accent6">
+              <a:lumMod val="60000"/>
+              <a:lumOff val="40000"/>
+            </a:schemeClr>
+          </a:solidFill>
+          <a:ln>
+            <a:solidFill>
+              <a:schemeClr val="tx1"/>
+            </a:solidFill>
+          </a:ln>
+        </p:spPr>
+        <p:txBody>
+          <a:bodyPr wrap="square" rtlCol="0">
+            <a:spAutoFit/>
+          </a:bodyPr>
+          <a:lstStyle/>
+          <a:p>
+            <a:r>
+              <a:rPr lang="fr-CA" sz="2000" dirty="0" err="1"/>
+              <a:t>is_move_valid</a:t>
+            </a:r>
+            <a:r>
+              <a:rPr lang="en-US" sz="2000" dirty="0"/>
+              <a:t>(…)</a:t>
+            </a:r>
+            <a:endParaRPr lang="fr-CA" sz="2000" dirty="0"/>
+          </a:p>
+        </p:txBody>
+      </p:sp>
+    </p:spTree>
+    <p:extLst>
+      <p:ext uri="{BB962C8B-B14F-4D97-AF65-F5344CB8AC3E}">
+        <p14:creationId xmlns:p14="http://schemas.microsoft.com/office/powerpoint/2010/main" val="891613978"/>
+      </p:ext>
+    </p:extLst>
+  </p:cSld>
+  <p:clrMapOvr>
+    <a:masterClrMapping/>
+  </p:clrMapOvr>
+</p:sld>
+</file>
+
+<file path=ppt/slides/slide5.xml><?xml version="1.0" encoding="utf-8"?>
+<p:sld xmlns:a="http://schemas.openxmlformats.org/drawingml/2006/main" xmlns:r="http://schemas.openxmlformats.org/officeDocument/2006/relationships" xmlns:p="http://schemas.openxmlformats.org/presentationml/2006/main">
+  <p:cSld>
+    <p:spTree>
+      <p:nvGrpSpPr>
+        <p:cNvPr id="1" name=""/>
+        <p:cNvGrpSpPr/>
+        <p:nvPr/>
+      </p:nvGrpSpPr>
+      <p:grpSpPr>
+        <a:xfrm>
+          <a:off x="0" y="0"/>
+          <a:ext cx="0" cy="0"/>
+          <a:chOff x="0" y="0"/>
+          <a:chExt cx="0" cy="0"/>
+        </a:xfrm>
+      </p:grpSpPr>
+      <p:sp>
+        <p:nvSpPr>
+          <p:cNvPr id="4" name="TextBox 3">
+            <a:extLst>
+              <a:ext uri="{FF2B5EF4-FFF2-40B4-BE49-F238E27FC236}">
+                <a16:creationId xmlns:a16="http://schemas.microsoft.com/office/drawing/2014/main" id="{828CE5B0-24E3-CA45-6C54-38D5D1E9FC9E}"/>
+              </a:ext>
+            </a:extLst>
+          </p:cNvPr>
+          <p:cNvSpPr txBox="1"/>
+          <p:nvPr/>
+        </p:nvSpPr>
+        <p:spPr>
+          <a:xfrm>
+            <a:off x="110581" y="41465"/>
+            <a:ext cx="2579914" cy="400110"/>
+          </a:xfrm>
+          <a:prstGeom prst="rect">
+            <a:avLst/>
+          </a:prstGeom>
+          <a:solidFill>
+            <a:schemeClr val="accent6">
+              <a:lumMod val="60000"/>
+              <a:lumOff val="40000"/>
+            </a:schemeClr>
+          </a:solidFill>
+          <a:ln>
+            <a:solidFill>
+              <a:schemeClr val="tx1"/>
+            </a:solidFill>
+          </a:ln>
+        </p:spPr>
+        <p:txBody>
+          <a:bodyPr wrap="square" rtlCol="0">
+            <a:spAutoFit/>
+          </a:bodyPr>
+          <a:lstStyle/>
+          <a:p>
+            <a:r>
+              <a:rPr lang="fr-CA" sz="2000" dirty="0" err="1"/>
+              <a:t>minmaxAB_loop</a:t>
+            </a:r>
+            <a:r>
+              <a:rPr lang="en-US" sz="2000" dirty="0"/>
+              <a:t>(…)</a:t>
+            </a:r>
+            <a:endParaRPr lang="fr-CA" sz="2000" dirty="0"/>
+          </a:p>
+        </p:txBody>
+      </p:sp>
+      <p:sp>
+        <p:nvSpPr>
+          <p:cNvPr id="5" name="TextBox 4">
+            <a:extLst>
+              <a:ext uri="{FF2B5EF4-FFF2-40B4-BE49-F238E27FC236}">
+                <a16:creationId xmlns:a16="http://schemas.microsoft.com/office/drawing/2014/main" id="{220EAB38-3CE2-C36D-F289-34133E137A04}"/>
+              </a:ext>
+            </a:extLst>
+          </p:cNvPr>
+          <p:cNvSpPr txBox="1"/>
+          <p:nvPr/>
+        </p:nvSpPr>
+        <p:spPr>
+          <a:xfrm>
+            <a:off x="669381" y="503382"/>
+            <a:ext cx="2579914" cy="400110"/>
+          </a:xfrm>
+          <a:prstGeom prst="rect">
+            <a:avLst/>
+          </a:prstGeom>
+          <a:solidFill>
+            <a:schemeClr val="accent6">
+              <a:lumMod val="60000"/>
+              <a:lumOff val="40000"/>
+            </a:schemeClr>
+          </a:solidFill>
+          <a:ln>
+            <a:solidFill>
+              <a:schemeClr val="tx1"/>
+            </a:solidFill>
+          </a:ln>
+        </p:spPr>
+        <p:txBody>
+          <a:bodyPr wrap="square" rtlCol="0">
+            <a:spAutoFit/>
+          </a:bodyPr>
+          <a:lstStyle/>
+          <a:p>
+            <a:r>
+              <a:rPr lang="fr-CA" sz="2000" dirty="0" err="1"/>
+              <a:t>gameStateEval</a:t>
+            </a:r>
+            <a:r>
+              <a:rPr lang="en-US" sz="2000" dirty="0"/>
+              <a:t>(…)</a:t>
+            </a:r>
+            <a:endParaRPr lang="fr-CA" sz="2000" dirty="0"/>
+          </a:p>
+        </p:txBody>
+      </p:sp>
+      <p:sp>
+        <p:nvSpPr>
+          <p:cNvPr id="6" name="TextBox 5">
+            <a:extLst>
+              <a:ext uri="{FF2B5EF4-FFF2-40B4-BE49-F238E27FC236}">
+                <a16:creationId xmlns:a16="http://schemas.microsoft.com/office/drawing/2014/main" id="{18EF47E7-5258-F12B-6A41-0CF1698D5BC2}"/>
+              </a:ext>
+            </a:extLst>
+          </p:cNvPr>
+          <p:cNvSpPr txBox="1"/>
+          <p:nvPr/>
+        </p:nvSpPr>
+        <p:spPr>
+          <a:xfrm>
+            <a:off x="667476" y="965300"/>
+            <a:ext cx="3371124" cy="400110"/>
+          </a:xfrm>
+          <a:prstGeom prst="rect">
+            <a:avLst/>
+          </a:prstGeom>
+          <a:solidFill>
+            <a:schemeClr val="accent6">
+              <a:lumMod val="60000"/>
+              <a:lumOff val="40000"/>
+            </a:schemeClr>
+          </a:solidFill>
+          <a:ln>
+            <a:solidFill>
+              <a:schemeClr val="tx1"/>
+            </a:solidFill>
+          </a:ln>
+        </p:spPr>
+        <p:txBody>
+          <a:bodyPr wrap="square" rtlCol="0">
+            <a:spAutoFit/>
+          </a:bodyPr>
+          <a:lstStyle/>
+          <a:p>
+            <a:r>
+              <a:rPr lang="en-CA" sz="2000" dirty="0" err="1"/>
+              <a:t>get_all_psbl_alg_comm</a:t>
+            </a:r>
+            <a:r>
+              <a:rPr lang="en-US" sz="2000" dirty="0"/>
+              <a:t>(…)</a:t>
+            </a:r>
+            <a:endParaRPr lang="fr-CA" sz="2000" dirty="0"/>
+          </a:p>
+        </p:txBody>
+      </p:sp>
+      <p:sp>
+        <p:nvSpPr>
+          <p:cNvPr id="7" name="TextBox 6">
+            <a:extLst>
+              <a:ext uri="{FF2B5EF4-FFF2-40B4-BE49-F238E27FC236}">
+                <a16:creationId xmlns:a16="http://schemas.microsoft.com/office/drawing/2014/main" id="{29C826F2-46C7-F8F4-7B24-D78D41721A77}"/>
+              </a:ext>
+            </a:extLst>
+          </p:cNvPr>
+          <p:cNvSpPr txBox="1"/>
+          <p:nvPr/>
+        </p:nvSpPr>
+        <p:spPr>
+          <a:xfrm>
+            <a:off x="667476" y="2258342"/>
+            <a:ext cx="3371124" cy="400110"/>
+          </a:xfrm>
+          <a:prstGeom prst="rect">
+            <a:avLst/>
+          </a:prstGeom>
+          <a:solidFill>
+            <a:schemeClr val="accent6">
+              <a:lumMod val="60000"/>
+              <a:lumOff val="40000"/>
+            </a:schemeClr>
+          </a:solidFill>
+          <a:ln>
+            <a:solidFill>
+              <a:schemeClr val="tx1"/>
+            </a:solidFill>
+          </a:ln>
+        </p:spPr>
+        <p:txBody>
+          <a:bodyPr wrap="square" rtlCol="0">
+            <a:spAutoFit/>
+          </a:bodyPr>
+          <a:lstStyle/>
+          <a:p>
+            <a:r>
+              <a:rPr lang="fr-CA" sz="2000" dirty="0" err="1"/>
+              <a:t>ply_ag_comm</a:t>
+            </a:r>
+            <a:r>
+              <a:rPr lang="en-US" sz="2000" dirty="0"/>
+              <a:t>(…)</a:t>
+            </a:r>
+            <a:endParaRPr lang="fr-CA" sz="2000" dirty="0"/>
+          </a:p>
+        </p:txBody>
+      </p:sp>
+      <p:sp>
+        <p:nvSpPr>
+          <p:cNvPr id="8" name="TextBox 7">
+            <a:extLst>
+              <a:ext uri="{FF2B5EF4-FFF2-40B4-BE49-F238E27FC236}">
+                <a16:creationId xmlns:a16="http://schemas.microsoft.com/office/drawing/2014/main" id="{D933DB8D-E767-33C2-EDE7-9809215B6C1A}"/>
+              </a:ext>
+            </a:extLst>
+          </p:cNvPr>
+          <p:cNvSpPr txBox="1"/>
+          <p:nvPr/>
+        </p:nvSpPr>
+        <p:spPr>
+          <a:xfrm>
+            <a:off x="667476" y="4506340"/>
+            <a:ext cx="2579914" cy="400110"/>
+          </a:xfrm>
+          <a:prstGeom prst="rect">
+            <a:avLst/>
+          </a:prstGeom>
+          <a:solidFill>
+            <a:schemeClr val="accent6">
+              <a:lumMod val="60000"/>
+              <a:lumOff val="40000"/>
+            </a:schemeClr>
+          </a:solidFill>
+          <a:ln>
+            <a:solidFill>
+              <a:schemeClr val="tx1"/>
+            </a:solidFill>
+          </a:ln>
+        </p:spPr>
+        <p:txBody>
+          <a:bodyPr wrap="square" rtlCol="0">
+            <a:spAutoFit/>
+          </a:bodyPr>
+          <a:lstStyle/>
+          <a:p>
+            <a:r>
+              <a:rPr lang="fr-CA" sz="2000" dirty="0" err="1"/>
+              <a:t>minmaxAB_loop</a:t>
+            </a:r>
+            <a:r>
+              <a:rPr lang="en-US" sz="2000" dirty="0"/>
+              <a:t>(…)</a:t>
+            </a:r>
+            <a:endParaRPr lang="fr-CA" sz="2000" dirty="0"/>
+          </a:p>
+        </p:txBody>
+      </p:sp>
+      <p:sp>
+        <p:nvSpPr>
+          <p:cNvPr id="9" name="TextBox 8">
+            <a:extLst>
+              <a:ext uri="{FF2B5EF4-FFF2-40B4-BE49-F238E27FC236}">
+                <a16:creationId xmlns:a16="http://schemas.microsoft.com/office/drawing/2014/main" id="{6E4AF399-6608-BFB5-5D62-662DBE7BE2A9}"/>
+              </a:ext>
+            </a:extLst>
+          </p:cNvPr>
+          <p:cNvSpPr txBox="1"/>
+          <p:nvPr/>
+        </p:nvSpPr>
+        <p:spPr>
+          <a:xfrm>
+            <a:off x="1004933" y="1396314"/>
+            <a:ext cx="3371124" cy="400110"/>
+          </a:xfrm>
+          <a:prstGeom prst="rect">
+            <a:avLst/>
+          </a:prstGeom>
+          <a:solidFill>
+            <a:schemeClr val="accent6">
+              <a:lumMod val="60000"/>
+              <a:lumOff val="40000"/>
+            </a:schemeClr>
+          </a:solidFill>
+          <a:ln>
+            <a:solidFill>
+              <a:schemeClr val="tx1"/>
+            </a:solidFill>
+          </a:ln>
+        </p:spPr>
+        <p:txBody>
+          <a:bodyPr wrap="square" rtlCol="0">
+            <a:spAutoFit/>
+          </a:bodyPr>
+          <a:lstStyle/>
+          <a:p>
+            <a:r>
+              <a:rPr lang="fr-CA" sz="2000" dirty="0" err="1"/>
+              <a:t>get_all_valid_atks</a:t>
+            </a:r>
+            <a:r>
+              <a:rPr lang="en-US" sz="2000" dirty="0"/>
+              <a:t>(…)</a:t>
+            </a:r>
+            <a:endParaRPr lang="fr-CA" sz="2000" dirty="0"/>
+          </a:p>
+        </p:txBody>
+      </p:sp>
+      <p:sp>
+        <p:nvSpPr>
+          <p:cNvPr id="10" name="TextBox 9">
+            <a:extLst>
+              <a:ext uri="{FF2B5EF4-FFF2-40B4-BE49-F238E27FC236}">
+                <a16:creationId xmlns:a16="http://schemas.microsoft.com/office/drawing/2014/main" id="{DEF89BF0-B9DC-CF83-DFFD-493281632CA6}"/>
+              </a:ext>
+            </a:extLst>
+          </p:cNvPr>
+          <p:cNvSpPr txBox="1"/>
+          <p:nvPr/>
+        </p:nvSpPr>
+        <p:spPr>
+          <a:xfrm>
+            <a:off x="1004933" y="1827328"/>
+            <a:ext cx="3371124" cy="400110"/>
+          </a:xfrm>
+          <a:prstGeom prst="rect">
+            <a:avLst/>
+          </a:prstGeom>
+          <a:solidFill>
+            <a:schemeClr val="accent6">
+              <a:lumMod val="60000"/>
+              <a:lumOff val="40000"/>
+            </a:schemeClr>
+          </a:solidFill>
+          <a:ln>
+            <a:solidFill>
+              <a:schemeClr val="tx1"/>
+            </a:solidFill>
+          </a:ln>
+        </p:spPr>
+        <p:txBody>
+          <a:bodyPr wrap="square" rtlCol="0">
+            <a:spAutoFit/>
+          </a:bodyPr>
+          <a:lstStyle/>
+          <a:p>
+            <a:r>
+              <a:rPr lang="fr-CA" sz="2000" dirty="0" err="1"/>
+              <a:t>get_all_valid_moves</a:t>
+            </a:r>
+            <a:r>
+              <a:rPr lang="en-US" sz="2000" dirty="0"/>
+              <a:t>(…)</a:t>
+            </a:r>
+            <a:endParaRPr lang="fr-CA" sz="2000" dirty="0"/>
+          </a:p>
+        </p:txBody>
+      </p:sp>
+      <p:sp>
+        <p:nvSpPr>
+          <p:cNvPr id="11" name="TextBox 10">
+            <a:extLst>
+              <a:ext uri="{FF2B5EF4-FFF2-40B4-BE49-F238E27FC236}">
+                <a16:creationId xmlns:a16="http://schemas.microsoft.com/office/drawing/2014/main" id="{15655BF6-5EC6-E413-1007-830592E046EB}"/>
+              </a:ext>
+            </a:extLst>
+          </p:cNvPr>
+          <p:cNvSpPr txBox="1"/>
+          <p:nvPr/>
+        </p:nvSpPr>
+        <p:spPr>
+          <a:xfrm>
+            <a:off x="1003028" y="2720259"/>
+            <a:ext cx="2579914" cy="400110"/>
+          </a:xfrm>
+          <a:prstGeom prst="rect">
+            <a:avLst/>
+          </a:prstGeom>
+          <a:solidFill>
+            <a:schemeClr val="tx2">
+              <a:lumMod val="50000"/>
+              <a:lumOff val="50000"/>
+            </a:schemeClr>
+          </a:solidFill>
+          <a:ln>
+            <a:solidFill>
+              <a:schemeClr val="tx1"/>
+            </a:solidFill>
+          </a:ln>
+        </p:spPr>
+        <p:txBody>
+          <a:bodyPr wrap="square" rtlCol="0">
+            <a:spAutoFit/>
+          </a:bodyPr>
+          <a:lstStyle/>
+          <a:p>
+            <a:r>
+              <a:rPr lang="fr-CA" sz="2000" dirty="0" err="1"/>
+              <a:t>is_atk_valid</a:t>
+            </a:r>
+            <a:r>
+              <a:rPr lang="en-US" sz="2000" dirty="0"/>
+              <a:t>(…)</a:t>
+            </a:r>
+            <a:endParaRPr lang="fr-CA" sz="2000" dirty="0"/>
+          </a:p>
+        </p:txBody>
+      </p:sp>
+      <p:sp>
+        <p:nvSpPr>
+          <p:cNvPr id="12" name="TextBox 11">
+            <a:extLst>
+              <a:ext uri="{FF2B5EF4-FFF2-40B4-BE49-F238E27FC236}">
+                <a16:creationId xmlns:a16="http://schemas.microsoft.com/office/drawing/2014/main" id="{90B2CDA0-12F5-5A7B-3343-7E185518A40B}"/>
+              </a:ext>
+            </a:extLst>
+          </p:cNvPr>
+          <p:cNvSpPr txBox="1"/>
+          <p:nvPr/>
+        </p:nvSpPr>
+        <p:spPr>
+          <a:xfrm>
+            <a:off x="1003028" y="3167397"/>
+            <a:ext cx="2579914" cy="400110"/>
+          </a:xfrm>
+          <a:prstGeom prst="rect">
+            <a:avLst/>
+          </a:prstGeom>
+          <a:solidFill>
+            <a:schemeClr val="tx2">
+              <a:lumMod val="50000"/>
+              <a:lumOff val="50000"/>
+            </a:schemeClr>
+          </a:solidFill>
+          <a:ln>
+            <a:solidFill>
+              <a:schemeClr val="tx1"/>
+            </a:solidFill>
+          </a:ln>
+        </p:spPr>
+        <p:txBody>
+          <a:bodyPr wrap="square" rtlCol="0">
+            <a:spAutoFit/>
+          </a:bodyPr>
+          <a:lstStyle/>
+          <a:p>
+            <a:r>
+              <a:rPr lang="fr-CA" sz="2000" dirty="0" err="1"/>
+              <a:t>is_move_valid</a:t>
+            </a:r>
+            <a:r>
+              <a:rPr lang="en-US" sz="2000" dirty="0"/>
+              <a:t>(…)</a:t>
+            </a:r>
+            <a:endParaRPr lang="fr-CA" sz="2000" dirty="0"/>
+          </a:p>
+        </p:txBody>
+      </p:sp>
+      <p:sp>
+        <p:nvSpPr>
+          <p:cNvPr id="13" name="TextBox 12">
+            <a:extLst>
+              <a:ext uri="{FF2B5EF4-FFF2-40B4-BE49-F238E27FC236}">
+                <a16:creationId xmlns:a16="http://schemas.microsoft.com/office/drawing/2014/main" id="{4A13A9EB-813E-55FA-2F6E-5359E0019D53}"/>
+              </a:ext>
+            </a:extLst>
+          </p:cNvPr>
+          <p:cNvSpPr txBox="1"/>
+          <p:nvPr/>
+        </p:nvSpPr>
+        <p:spPr>
+          <a:xfrm>
+            <a:off x="1003028" y="3612064"/>
+            <a:ext cx="2579914" cy="400110"/>
+          </a:xfrm>
+          <a:prstGeom prst="rect">
+            <a:avLst/>
+          </a:prstGeom>
+          <a:solidFill>
+            <a:schemeClr val="accent6">
+              <a:lumMod val="60000"/>
+              <a:lumOff val="40000"/>
+            </a:schemeClr>
+          </a:solidFill>
+          <a:ln>
+            <a:solidFill>
+              <a:schemeClr val="tx1"/>
+            </a:solidFill>
+          </a:ln>
+        </p:spPr>
+        <p:txBody>
+          <a:bodyPr wrap="square" rtlCol="0">
+            <a:spAutoFit/>
+          </a:bodyPr>
+          <a:lstStyle/>
+          <a:p>
+            <a:r>
+              <a:rPr lang="en-US" sz="2000" dirty="0"/>
+              <a:t>ply(…)</a:t>
+            </a:r>
+            <a:endParaRPr lang="fr-CA" sz="2000" dirty="0"/>
+          </a:p>
+        </p:txBody>
+      </p:sp>
+      <p:sp>
+        <p:nvSpPr>
+          <p:cNvPr id="14" name="TextBox 13">
+            <a:extLst>
+              <a:ext uri="{FF2B5EF4-FFF2-40B4-BE49-F238E27FC236}">
+                <a16:creationId xmlns:a16="http://schemas.microsoft.com/office/drawing/2014/main" id="{C52D4EBC-08D5-6172-3CB8-98A4DB377EB5}"/>
+              </a:ext>
+            </a:extLst>
+          </p:cNvPr>
+          <p:cNvSpPr txBox="1"/>
+          <p:nvPr/>
+        </p:nvSpPr>
+        <p:spPr>
+          <a:xfrm>
+            <a:off x="1003028" y="4059202"/>
+            <a:ext cx="2579914" cy="400110"/>
+          </a:xfrm>
+          <a:prstGeom prst="rect">
+            <a:avLst/>
+          </a:prstGeom>
+          <a:solidFill>
+            <a:schemeClr val="accent6">
+              <a:lumMod val="60000"/>
+              <a:lumOff val="40000"/>
+            </a:schemeClr>
+          </a:solidFill>
+          <a:ln>
+            <a:solidFill>
+              <a:schemeClr val="tx1"/>
+            </a:solidFill>
+          </a:ln>
+        </p:spPr>
+        <p:txBody>
+          <a:bodyPr wrap="square" rtlCol="0">
+            <a:spAutoFit/>
+          </a:bodyPr>
+          <a:lstStyle/>
+          <a:p>
+            <a:r>
+              <a:rPr lang="fr-CA" sz="2000" dirty="0" err="1"/>
+              <a:t>promote</a:t>
+            </a:r>
+            <a:r>
+              <a:rPr lang="en-US" sz="2000" dirty="0"/>
+              <a:t>(…)</a:t>
+            </a:r>
+            <a:endParaRPr lang="fr-CA" sz="2000" dirty="0"/>
+          </a:p>
+        </p:txBody>
+      </p:sp>
+      <p:sp>
+        <p:nvSpPr>
+          <p:cNvPr id="19" name="TextBox 18">
+            <a:extLst>
+              <a:ext uri="{FF2B5EF4-FFF2-40B4-BE49-F238E27FC236}">
+                <a16:creationId xmlns:a16="http://schemas.microsoft.com/office/drawing/2014/main" id="{E9A46817-11A8-A9D0-1FD9-1C88F2F8D6BE}"/>
+              </a:ext>
+            </a:extLst>
+          </p:cNvPr>
+          <p:cNvSpPr txBox="1"/>
+          <p:nvPr/>
+        </p:nvSpPr>
+        <p:spPr>
+          <a:xfrm>
+            <a:off x="4691790" y="3604461"/>
+            <a:ext cx="2579914" cy="400110"/>
+          </a:xfrm>
+          <a:prstGeom prst="rect">
+            <a:avLst/>
+          </a:prstGeom>
+          <a:solidFill>
+            <a:schemeClr val="accent6">
+              <a:lumMod val="60000"/>
+              <a:lumOff val="40000"/>
+            </a:schemeClr>
+          </a:solidFill>
+          <a:ln>
+            <a:solidFill>
+              <a:schemeClr val="tx1"/>
+            </a:solidFill>
+          </a:ln>
+        </p:spPr>
+        <p:txBody>
+          <a:bodyPr wrap="square" rtlCol="0">
+            <a:spAutoFit/>
+          </a:bodyPr>
+          <a:lstStyle/>
+          <a:p>
+            <a:r>
+              <a:rPr lang="en-US" sz="2000" dirty="0"/>
+              <a:t>ply(…)</a:t>
+            </a:r>
+            <a:endParaRPr lang="fr-CA" sz="2000" dirty="0"/>
+          </a:p>
+        </p:txBody>
+      </p:sp>
+      <p:sp>
+        <p:nvSpPr>
+          <p:cNvPr id="20" name="TextBox 19">
+            <a:extLst>
+              <a:ext uri="{FF2B5EF4-FFF2-40B4-BE49-F238E27FC236}">
+                <a16:creationId xmlns:a16="http://schemas.microsoft.com/office/drawing/2014/main" id="{A5BB8364-0406-E1DA-2C52-E02981F0FC1D}"/>
+              </a:ext>
+            </a:extLst>
+          </p:cNvPr>
+          <p:cNvSpPr txBox="1"/>
+          <p:nvPr/>
+        </p:nvSpPr>
+        <p:spPr>
+          <a:xfrm>
+            <a:off x="4985525" y="4056884"/>
+            <a:ext cx="2579914" cy="400110"/>
+          </a:xfrm>
+          <a:prstGeom prst="rect">
+            <a:avLst/>
+          </a:prstGeom>
+          <a:solidFill>
+            <a:schemeClr val="accent6">
+              <a:lumMod val="60000"/>
+              <a:lumOff val="40000"/>
+            </a:schemeClr>
+          </a:solidFill>
+          <a:ln>
+            <a:solidFill>
+              <a:schemeClr val="tx1"/>
+            </a:solidFill>
+          </a:ln>
+        </p:spPr>
+        <p:txBody>
+          <a:bodyPr wrap="square" rtlCol="0">
+            <a:spAutoFit/>
+          </a:bodyPr>
+          <a:lstStyle/>
+          <a:p>
+            <a:r>
+              <a:rPr lang="en-US" sz="2000" dirty="0"/>
+              <a:t>play(…)</a:t>
+            </a:r>
+            <a:endParaRPr lang="fr-CA" sz="2000" dirty="0"/>
+          </a:p>
+        </p:txBody>
+      </p:sp>
+      <p:sp>
+        <p:nvSpPr>
+          <p:cNvPr id="21" name="TextBox 20">
+            <a:extLst>
+              <a:ext uri="{FF2B5EF4-FFF2-40B4-BE49-F238E27FC236}">
+                <a16:creationId xmlns:a16="http://schemas.microsoft.com/office/drawing/2014/main" id="{3385DAC2-EEE3-1873-E657-1790B2E43388}"/>
+              </a:ext>
+            </a:extLst>
+          </p:cNvPr>
+          <p:cNvSpPr txBox="1"/>
+          <p:nvPr/>
+        </p:nvSpPr>
+        <p:spPr>
+          <a:xfrm>
+            <a:off x="5316949" y="4509087"/>
+            <a:ext cx="2579914" cy="400110"/>
+          </a:xfrm>
+          <a:prstGeom prst="rect">
+            <a:avLst/>
+          </a:prstGeom>
+          <a:solidFill>
+            <a:schemeClr val="tx2">
+              <a:lumMod val="50000"/>
+              <a:lumOff val="50000"/>
+            </a:schemeClr>
+          </a:solidFill>
+          <a:ln>
+            <a:solidFill>
+              <a:schemeClr val="tx1"/>
+            </a:solidFill>
+          </a:ln>
+        </p:spPr>
+        <p:txBody>
+          <a:bodyPr wrap="square" rtlCol="0">
+            <a:spAutoFit/>
+          </a:bodyPr>
+          <a:lstStyle/>
+          <a:p>
+            <a:r>
+              <a:rPr lang="fr-CA" sz="2000" dirty="0" err="1"/>
+              <a:t>is_move_valid</a:t>
+            </a:r>
+            <a:r>
+              <a:rPr lang="en-US" sz="2000" dirty="0"/>
+              <a:t>(…)</a:t>
+            </a:r>
+            <a:endParaRPr lang="fr-CA" sz="2000" dirty="0"/>
+          </a:p>
+        </p:txBody>
+      </p:sp>
+      <p:sp>
+        <p:nvSpPr>
+          <p:cNvPr id="22" name="TextBox 21">
+            <a:extLst>
+              <a:ext uri="{FF2B5EF4-FFF2-40B4-BE49-F238E27FC236}">
+                <a16:creationId xmlns:a16="http://schemas.microsoft.com/office/drawing/2014/main" id="{76B8CB29-826E-426D-C4A8-BADC4611EE6B}"/>
+              </a:ext>
+            </a:extLst>
+          </p:cNvPr>
+          <p:cNvSpPr txBox="1"/>
+          <p:nvPr/>
+        </p:nvSpPr>
+        <p:spPr>
+          <a:xfrm>
+            <a:off x="5316949" y="4971284"/>
+            <a:ext cx="2579914" cy="400110"/>
+          </a:xfrm>
+          <a:prstGeom prst="rect">
+            <a:avLst/>
+          </a:prstGeom>
+          <a:solidFill>
+            <a:schemeClr val="tx2">
+              <a:lumMod val="50000"/>
+              <a:lumOff val="50000"/>
+            </a:schemeClr>
+          </a:solidFill>
+          <a:ln>
+            <a:solidFill>
+              <a:schemeClr val="tx1"/>
+            </a:solidFill>
+          </a:ln>
+        </p:spPr>
+        <p:txBody>
+          <a:bodyPr wrap="square" rtlCol="0">
+            <a:spAutoFit/>
+          </a:bodyPr>
+          <a:lstStyle/>
+          <a:p>
+            <a:r>
+              <a:rPr lang="fr-CA" sz="2000" dirty="0" err="1"/>
+              <a:t>is_atk_valid</a:t>
+            </a:r>
+            <a:r>
+              <a:rPr lang="en-US" sz="2000" dirty="0"/>
+              <a:t>(…)</a:t>
+            </a:r>
+            <a:endParaRPr lang="fr-CA" sz="2000" dirty="0"/>
+          </a:p>
+        </p:txBody>
+      </p:sp>
+      <p:sp>
+        <p:nvSpPr>
+          <p:cNvPr id="23" name="TextBox 22">
+            <a:extLst>
+              <a:ext uri="{FF2B5EF4-FFF2-40B4-BE49-F238E27FC236}">
+                <a16:creationId xmlns:a16="http://schemas.microsoft.com/office/drawing/2014/main" id="{8C6A4599-E218-7F5B-320B-B00226D769EB}"/>
+              </a:ext>
+            </a:extLst>
+          </p:cNvPr>
+          <p:cNvSpPr txBox="1"/>
+          <p:nvPr/>
+        </p:nvSpPr>
+        <p:spPr>
+          <a:xfrm>
+            <a:off x="5316949" y="5423707"/>
+            <a:ext cx="2579914" cy="400110"/>
+          </a:xfrm>
+          <a:prstGeom prst="rect">
+            <a:avLst/>
+          </a:prstGeom>
+          <a:solidFill>
+            <a:schemeClr val="accent6">
+              <a:lumMod val="60000"/>
+              <a:lumOff val="40000"/>
+            </a:schemeClr>
+          </a:solidFill>
+          <a:ln>
+            <a:solidFill>
+              <a:schemeClr val="tx1"/>
+            </a:solidFill>
+          </a:ln>
+        </p:spPr>
+        <p:txBody>
+          <a:bodyPr wrap="square" rtlCol="0">
+            <a:spAutoFit/>
+          </a:bodyPr>
+          <a:lstStyle/>
+          <a:p>
+            <a:r>
+              <a:rPr lang="fr-CA" sz="2000" dirty="0" err="1"/>
+              <a:t>upd_post_play</a:t>
+            </a:r>
+            <a:r>
+              <a:rPr lang="en-US" sz="2000" dirty="0"/>
+              <a:t>(…)</a:t>
+            </a:r>
+            <a:endParaRPr lang="fr-CA" sz="2000" dirty="0"/>
+          </a:p>
+        </p:txBody>
+      </p:sp>
+      <p:sp>
+        <p:nvSpPr>
+          <p:cNvPr id="24" name="TextBox 23">
+            <a:extLst>
+              <a:ext uri="{FF2B5EF4-FFF2-40B4-BE49-F238E27FC236}">
+                <a16:creationId xmlns:a16="http://schemas.microsoft.com/office/drawing/2014/main" id="{E697CAB5-011D-0507-69F7-9D43BB52B663}"/>
+              </a:ext>
+            </a:extLst>
+          </p:cNvPr>
+          <p:cNvSpPr txBox="1"/>
+          <p:nvPr/>
+        </p:nvSpPr>
+        <p:spPr>
+          <a:xfrm>
+            <a:off x="4985525" y="5876130"/>
+            <a:ext cx="3051038" cy="400110"/>
+          </a:xfrm>
+          <a:prstGeom prst="rect">
+            <a:avLst/>
+          </a:prstGeom>
+          <a:solidFill>
+            <a:schemeClr val="accent6">
+              <a:lumMod val="60000"/>
+              <a:lumOff val="40000"/>
+            </a:schemeClr>
+          </a:solidFill>
+          <a:ln>
+            <a:solidFill>
+              <a:schemeClr val="tx1"/>
+            </a:solidFill>
+          </a:ln>
+        </p:spPr>
+        <p:txBody>
+          <a:bodyPr wrap="square" rtlCol="0">
+            <a:spAutoFit/>
+          </a:bodyPr>
+          <a:lstStyle/>
+          <a:p>
+            <a:r>
+              <a:rPr lang="fr-CA" sz="2000" dirty="0" err="1"/>
+              <a:t>upd_end_game_state</a:t>
+            </a:r>
+            <a:r>
+              <a:rPr lang="fr-CA" sz="2000" dirty="0"/>
+              <a:t>(…)</a:t>
+            </a:r>
+          </a:p>
+        </p:txBody>
+      </p:sp>
+      <p:sp>
+        <p:nvSpPr>
+          <p:cNvPr id="25" name="TextBox 24">
+            <a:extLst>
+              <a:ext uri="{FF2B5EF4-FFF2-40B4-BE49-F238E27FC236}">
+                <a16:creationId xmlns:a16="http://schemas.microsoft.com/office/drawing/2014/main" id="{55A11505-87DC-9075-2BCF-84D5FD693683}"/>
+              </a:ext>
+            </a:extLst>
+          </p:cNvPr>
+          <p:cNvSpPr txBox="1"/>
+          <p:nvPr/>
+        </p:nvSpPr>
+        <p:spPr>
+          <a:xfrm>
+            <a:off x="5855335" y="888135"/>
+            <a:ext cx="3371124" cy="400110"/>
+          </a:xfrm>
+          <a:prstGeom prst="rect">
+            <a:avLst/>
+          </a:prstGeom>
+          <a:solidFill>
+            <a:schemeClr val="accent6">
+              <a:lumMod val="60000"/>
+              <a:lumOff val="40000"/>
+            </a:schemeClr>
+          </a:solidFill>
+          <a:ln>
+            <a:solidFill>
+              <a:schemeClr val="tx1"/>
+            </a:solidFill>
+          </a:ln>
+        </p:spPr>
+        <p:txBody>
+          <a:bodyPr wrap="square" rtlCol="0">
+            <a:spAutoFit/>
+          </a:bodyPr>
+          <a:lstStyle/>
+          <a:p>
+            <a:r>
+              <a:rPr lang="en-CA" sz="2000" dirty="0" err="1"/>
+              <a:t>get_all_valid_atk_sq</a:t>
+            </a:r>
+            <a:r>
+              <a:rPr lang="en-US" sz="2000" dirty="0"/>
+              <a:t>(…)</a:t>
+            </a:r>
+            <a:endParaRPr lang="fr-CA" sz="2000" dirty="0"/>
+          </a:p>
+        </p:txBody>
+      </p:sp>
+      <p:sp>
+        <p:nvSpPr>
+          <p:cNvPr id="26" name="TextBox 25">
+            <a:extLst>
+              <a:ext uri="{FF2B5EF4-FFF2-40B4-BE49-F238E27FC236}">
+                <a16:creationId xmlns:a16="http://schemas.microsoft.com/office/drawing/2014/main" id="{D71A688E-961A-24DD-9D1B-F4C58C20FF28}"/>
+              </a:ext>
+            </a:extLst>
+          </p:cNvPr>
+          <p:cNvSpPr txBox="1"/>
+          <p:nvPr/>
+        </p:nvSpPr>
+        <p:spPr>
+          <a:xfrm>
+            <a:off x="6149070" y="1345335"/>
+            <a:ext cx="3371124" cy="400110"/>
+          </a:xfrm>
+          <a:prstGeom prst="rect">
+            <a:avLst/>
+          </a:prstGeom>
+          <a:solidFill>
+            <a:schemeClr val="accent6">
+              <a:lumMod val="60000"/>
+              <a:lumOff val="40000"/>
+            </a:schemeClr>
+          </a:solidFill>
+          <a:ln>
+            <a:solidFill>
+              <a:schemeClr val="tx1"/>
+            </a:solidFill>
+          </a:ln>
+        </p:spPr>
+        <p:txBody>
+          <a:bodyPr wrap="square" rtlCol="0">
+            <a:spAutoFit/>
+          </a:bodyPr>
+          <a:lstStyle/>
+          <a:p>
+            <a:r>
+              <a:rPr lang="fr-CA" sz="2000" dirty="0" err="1"/>
+              <a:t>get_all_atk_sq</a:t>
+            </a:r>
+            <a:r>
+              <a:rPr lang="en-US" sz="2000" dirty="0"/>
+              <a:t>(…)</a:t>
+            </a:r>
+            <a:endParaRPr lang="fr-CA" sz="2000" dirty="0"/>
+          </a:p>
+        </p:txBody>
+      </p:sp>
+      <p:sp>
+        <p:nvSpPr>
+          <p:cNvPr id="27" name="TextBox 26">
+            <a:extLst>
+              <a:ext uri="{FF2B5EF4-FFF2-40B4-BE49-F238E27FC236}">
+                <a16:creationId xmlns:a16="http://schemas.microsoft.com/office/drawing/2014/main" id="{B1AA5932-8A06-F4D0-D5D0-71BD4F04273C}"/>
+              </a:ext>
+            </a:extLst>
+          </p:cNvPr>
+          <p:cNvSpPr txBox="1"/>
+          <p:nvPr/>
+        </p:nvSpPr>
+        <p:spPr>
+          <a:xfrm>
+            <a:off x="5586142" y="441575"/>
+            <a:ext cx="3371124" cy="400110"/>
+          </a:xfrm>
+          <a:prstGeom prst="rect">
+            <a:avLst/>
+          </a:prstGeom>
+          <a:solidFill>
+            <a:schemeClr val="accent6">
+              <a:lumMod val="60000"/>
+              <a:lumOff val="40000"/>
+            </a:schemeClr>
+          </a:solidFill>
+          <a:ln>
+            <a:solidFill>
+              <a:schemeClr val="tx1"/>
+            </a:solidFill>
+          </a:ln>
+        </p:spPr>
+        <p:txBody>
+          <a:bodyPr wrap="square" rtlCol="0">
+            <a:spAutoFit/>
+          </a:bodyPr>
+          <a:lstStyle/>
+          <a:p>
+            <a:r>
+              <a:rPr lang="fr-CA" sz="2000" dirty="0" err="1"/>
+              <a:t>get_all_valid_atks</a:t>
+            </a:r>
+            <a:r>
+              <a:rPr lang="en-US" sz="2000" dirty="0"/>
+              <a:t>(…)</a:t>
+            </a:r>
+            <a:endParaRPr lang="fr-CA" sz="2000" dirty="0"/>
+          </a:p>
+        </p:txBody>
+      </p:sp>
+      <p:sp>
+        <p:nvSpPr>
+          <p:cNvPr id="28" name="TextBox 27">
+            <a:extLst>
+              <a:ext uri="{FF2B5EF4-FFF2-40B4-BE49-F238E27FC236}">
+                <a16:creationId xmlns:a16="http://schemas.microsoft.com/office/drawing/2014/main" id="{41BFCFD1-2F0A-5041-C544-919CEB4243D5}"/>
+              </a:ext>
+            </a:extLst>
+          </p:cNvPr>
+          <p:cNvSpPr txBox="1"/>
+          <p:nvPr/>
+        </p:nvSpPr>
+        <p:spPr>
+          <a:xfrm>
+            <a:off x="5855335" y="2518330"/>
+            <a:ext cx="3371124" cy="400110"/>
+          </a:xfrm>
+          <a:prstGeom prst="rect">
+            <a:avLst/>
+          </a:prstGeom>
+          <a:solidFill>
+            <a:schemeClr val="accent6">
+              <a:lumMod val="60000"/>
+              <a:lumOff val="40000"/>
+            </a:schemeClr>
+          </a:solidFill>
+          <a:ln>
+            <a:solidFill>
+              <a:schemeClr val="tx1"/>
+            </a:solidFill>
+          </a:ln>
+        </p:spPr>
+        <p:txBody>
+          <a:bodyPr wrap="square" rtlCol="0">
+            <a:spAutoFit/>
+          </a:bodyPr>
+          <a:lstStyle/>
+          <a:p>
+            <a:r>
+              <a:rPr lang="en-CA" sz="2000" dirty="0" err="1"/>
+              <a:t>get_all_valid_move_sq</a:t>
+            </a:r>
+            <a:r>
+              <a:rPr lang="en-US" sz="2000" dirty="0"/>
+              <a:t>(…)</a:t>
+            </a:r>
+            <a:endParaRPr lang="fr-CA" sz="2000" dirty="0"/>
+          </a:p>
+        </p:txBody>
+      </p:sp>
+      <p:sp>
+        <p:nvSpPr>
+          <p:cNvPr id="29" name="TextBox 28">
+            <a:extLst>
+              <a:ext uri="{FF2B5EF4-FFF2-40B4-BE49-F238E27FC236}">
+                <a16:creationId xmlns:a16="http://schemas.microsoft.com/office/drawing/2014/main" id="{A87C42B7-917A-6444-4B5C-808B889965AC}"/>
+              </a:ext>
+            </a:extLst>
+          </p:cNvPr>
+          <p:cNvSpPr txBox="1"/>
+          <p:nvPr/>
+        </p:nvSpPr>
+        <p:spPr>
+          <a:xfrm>
+            <a:off x="6096000" y="2970533"/>
+            <a:ext cx="3371124" cy="400110"/>
+          </a:xfrm>
+          <a:prstGeom prst="rect">
+            <a:avLst/>
+          </a:prstGeom>
+          <a:solidFill>
+            <a:schemeClr val="accent6">
+              <a:lumMod val="60000"/>
+              <a:lumOff val="40000"/>
+            </a:schemeClr>
+          </a:solidFill>
+          <a:ln>
+            <a:solidFill>
+              <a:schemeClr val="tx1"/>
+            </a:solidFill>
+          </a:ln>
+        </p:spPr>
+        <p:txBody>
+          <a:bodyPr wrap="square" rtlCol="0">
+            <a:spAutoFit/>
+          </a:bodyPr>
+          <a:lstStyle/>
+          <a:p>
+            <a:r>
+              <a:rPr lang="fr-CA" sz="2000" dirty="0" err="1"/>
+              <a:t>is_move_valid</a:t>
+            </a:r>
+            <a:r>
+              <a:rPr lang="en-US" sz="2000" dirty="0"/>
+              <a:t>(…)</a:t>
+            </a:r>
+            <a:endParaRPr lang="fr-CA" sz="2000" dirty="0"/>
+          </a:p>
+        </p:txBody>
+      </p:sp>
+      <p:sp>
+        <p:nvSpPr>
+          <p:cNvPr id="30" name="TextBox 29">
+            <a:extLst>
+              <a:ext uri="{FF2B5EF4-FFF2-40B4-BE49-F238E27FC236}">
+                <a16:creationId xmlns:a16="http://schemas.microsoft.com/office/drawing/2014/main" id="{909BAF2B-FC4C-AA4B-D01E-43A0876A4041}"/>
+              </a:ext>
+            </a:extLst>
+          </p:cNvPr>
+          <p:cNvSpPr txBox="1"/>
+          <p:nvPr/>
+        </p:nvSpPr>
+        <p:spPr>
+          <a:xfrm>
+            <a:off x="5586142" y="2081059"/>
+            <a:ext cx="3371124" cy="400110"/>
+          </a:xfrm>
+          <a:prstGeom prst="rect">
+            <a:avLst/>
+          </a:prstGeom>
+          <a:solidFill>
+            <a:schemeClr val="accent6">
+              <a:lumMod val="60000"/>
+              <a:lumOff val="40000"/>
+            </a:schemeClr>
+          </a:solidFill>
+          <a:ln>
+            <a:solidFill>
+              <a:schemeClr val="tx1"/>
+            </a:solidFill>
+          </a:ln>
+        </p:spPr>
+        <p:txBody>
+          <a:bodyPr wrap="square" rtlCol="0">
+            <a:spAutoFit/>
+          </a:bodyPr>
+          <a:lstStyle/>
+          <a:p>
+            <a:r>
+              <a:rPr lang="fr-CA" sz="2000" dirty="0" err="1"/>
+              <a:t>get_all_valid_moves</a:t>
+            </a:r>
+            <a:r>
+              <a:rPr lang="en-US" sz="2000" dirty="0"/>
+              <a:t>(…)</a:t>
+            </a:r>
+            <a:endParaRPr lang="fr-CA" sz="2000" dirty="0"/>
+          </a:p>
+        </p:txBody>
+      </p:sp>
+    </p:spTree>
+    <p:extLst>
+      <p:ext uri="{BB962C8B-B14F-4D97-AF65-F5344CB8AC3E}">
+        <p14:creationId xmlns:p14="http://schemas.microsoft.com/office/powerpoint/2010/main" val="2494214635"/>
       </p:ext>
     </p:extLst>
   </p:cSld>

</xml_diff>

<commit_message>
chess: play(...) no longers check for validity in move or attack. The task now falls on ply(...).
</commit_message>
<xml_diff>
--- a/docs/chess_structure.pptx
+++ b/docs/chess_structure.pptx
@@ -5816,9 +5816,9 @@
             <a:avLst/>
           </a:prstGeom>
           <a:solidFill>
-            <a:schemeClr val="accent6">
-              <a:lumMod val="60000"/>
-              <a:lumOff val="40000"/>
+            <a:schemeClr val="tx2">
+              <a:lumMod val="50000"/>
+              <a:lumOff val="50000"/>
             </a:schemeClr>
           </a:solidFill>
           <a:ln>

</xml_diff>

<commit_message>
chess: testing updated for modifications in play(...) and ply(...).
</commit_message>
<xml_diff>
--- a/docs/chess_structure.pptx
+++ b/docs/chess_structure.pptx
@@ -3491,7 +3491,7 @@
         </p:nvSpPr>
         <p:spPr>
           <a:xfrm>
-            <a:off x="1038362" y="924447"/>
+            <a:off x="1038362" y="1919780"/>
             <a:ext cx="2579914" cy="400110"/>
           </a:xfrm>
           <a:prstGeom prst="rect">
@@ -3537,7 +3537,7 @@
         </p:nvSpPr>
         <p:spPr>
           <a:xfrm>
-            <a:off x="2071144" y="1522141"/>
+            <a:off x="1038362" y="854765"/>
             <a:ext cx="2579914" cy="400110"/>
           </a:xfrm>
           <a:prstGeom prst="rect">
@@ -3587,7 +3587,7 @@
         </p:nvSpPr>
         <p:spPr>
           <a:xfrm>
-            <a:off x="2071144" y="2145998"/>
+            <a:off x="1038362" y="1405778"/>
             <a:ext cx="2579914" cy="400110"/>
           </a:xfrm>
           <a:prstGeom prst="rect">
@@ -3637,7 +3637,7 @@
         </p:nvSpPr>
         <p:spPr>
           <a:xfrm>
-            <a:off x="2071144" y="2891360"/>
+            <a:off x="1999707" y="2534695"/>
             <a:ext cx="2579914" cy="400110"/>
           </a:xfrm>
           <a:prstGeom prst="rect">
@@ -3687,7 +3687,7 @@
         </p:nvSpPr>
         <p:spPr>
           <a:xfrm>
-            <a:off x="1038362" y="3636722"/>
+            <a:off x="1038362" y="3048697"/>
             <a:ext cx="3051038" cy="400110"/>
           </a:xfrm>
           <a:prstGeom prst="rect">
@@ -5364,7 +5364,7 @@
         </p:nvSpPr>
         <p:spPr>
           <a:xfrm>
-            <a:off x="4985525" y="4056884"/>
+            <a:off x="5316949" y="4985114"/>
             <a:ext cx="2579914" cy="400110"/>
           </a:xfrm>
           <a:prstGeom prst="rect">
@@ -5410,7 +5410,7 @@
         </p:nvSpPr>
         <p:spPr>
           <a:xfrm>
-            <a:off x="5316949" y="4509087"/>
+            <a:off x="4985525" y="4056664"/>
             <a:ext cx="2579914" cy="400110"/>
           </a:xfrm>
           <a:prstGeom prst="rect">
@@ -5460,7 +5460,7 @@
         </p:nvSpPr>
         <p:spPr>
           <a:xfrm>
-            <a:off x="5316949" y="4971284"/>
+            <a:off x="4985525" y="4518861"/>
             <a:ext cx="2579914" cy="400110"/>
           </a:xfrm>
           <a:prstGeom prst="rect">
@@ -5895,6 +5895,134 @@
           </a:p>
         </p:txBody>
       </p:sp>
+      <p:cxnSp>
+        <p:nvCxnSpPr>
+          <p:cNvPr id="3" name="Straight Arrow Connector 2">
+            <a:extLst>
+              <a:ext uri="{FF2B5EF4-FFF2-40B4-BE49-F238E27FC236}">
+                <a16:creationId xmlns:a16="http://schemas.microsoft.com/office/drawing/2014/main" id="{F81BF18D-EC8D-5B0A-2F36-2274C70C2A5F}"/>
+              </a:ext>
+            </a:extLst>
+          </p:cNvPr>
+          <p:cNvCxnSpPr>
+            <a:stCxn id="9" idx="3"/>
+            <a:endCxn id="27" idx="1"/>
+          </p:cNvCxnSpPr>
+          <p:nvPr/>
+        </p:nvCxnSpPr>
+        <p:spPr>
+          <a:xfrm flipV="1">
+            <a:off x="4376057" y="641630"/>
+            <a:ext cx="1210085" cy="954739"/>
+          </a:xfrm>
+          <a:prstGeom prst="straightConnector1">
+            <a:avLst/>
+          </a:prstGeom>
+          <a:ln w="57150">
+            <a:tailEnd type="arrow" w="lg" len="med"/>
+          </a:ln>
+        </p:spPr>
+        <p:style>
+          <a:lnRef idx="2">
+            <a:schemeClr val="accent1"/>
+          </a:lnRef>
+          <a:fillRef idx="0">
+            <a:schemeClr val="accent1"/>
+          </a:fillRef>
+          <a:effectRef idx="1">
+            <a:schemeClr val="accent1"/>
+          </a:effectRef>
+          <a:fontRef idx="minor">
+            <a:schemeClr val="tx1"/>
+          </a:fontRef>
+        </p:style>
+      </p:cxnSp>
+      <p:cxnSp>
+        <p:nvCxnSpPr>
+          <p:cNvPr id="15" name="Straight Arrow Connector 14">
+            <a:extLst>
+              <a:ext uri="{FF2B5EF4-FFF2-40B4-BE49-F238E27FC236}">
+                <a16:creationId xmlns:a16="http://schemas.microsoft.com/office/drawing/2014/main" id="{4BB9DE1D-7A34-E5A5-AF16-F564DA7D9C98}"/>
+              </a:ext>
+            </a:extLst>
+          </p:cNvPr>
+          <p:cNvCxnSpPr>
+            <a:cxnSpLocks/>
+            <a:stCxn id="10" idx="3"/>
+            <a:endCxn id="30" idx="1"/>
+          </p:cNvCxnSpPr>
+          <p:nvPr/>
+        </p:nvCxnSpPr>
+        <p:spPr>
+          <a:xfrm>
+            <a:off x="4376057" y="2027383"/>
+            <a:ext cx="1210085" cy="253731"/>
+          </a:xfrm>
+          <a:prstGeom prst="straightConnector1">
+            <a:avLst/>
+          </a:prstGeom>
+          <a:ln w="57150">
+            <a:tailEnd type="arrow" w="lg" len="med"/>
+          </a:ln>
+        </p:spPr>
+        <p:style>
+          <a:lnRef idx="2">
+            <a:schemeClr val="accent1"/>
+          </a:lnRef>
+          <a:fillRef idx="0">
+            <a:schemeClr val="accent1"/>
+          </a:fillRef>
+          <a:effectRef idx="1">
+            <a:schemeClr val="accent1"/>
+          </a:effectRef>
+          <a:fontRef idx="minor">
+            <a:schemeClr val="tx1"/>
+          </a:fontRef>
+        </p:style>
+      </p:cxnSp>
+      <p:cxnSp>
+        <p:nvCxnSpPr>
+          <p:cNvPr id="18" name="Straight Arrow Connector 17">
+            <a:extLst>
+              <a:ext uri="{FF2B5EF4-FFF2-40B4-BE49-F238E27FC236}">
+                <a16:creationId xmlns:a16="http://schemas.microsoft.com/office/drawing/2014/main" id="{73BE38C0-A4EC-0577-9DC1-933AA1328461}"/>
+              </a:ext>
+            </a:extLst>
+          </p:cNvPr>
+          <p:cNvCxnSpPr>
+            <a:cxnSpLocks/>
+            <a:stCxn id="13" idx="3"/>
+            <a:endCxn id="19" idx="1"/>
+          </p:cNvCxnSpPr>
+          <p:nvPr/>
+        </p:nvCxnSpPr>
+        <p:spPr>
+          <a:xfrm flipV="1">
+            <a:off x="3582942" y="3804516"/>
+            <a:ext cx="1108848" cy="7603"/>
+          </a:xfrm>
+          <a:prstGeom prst="straightConnector1">
+            <a:avLst/>
+          </a:prstGeom>
+          <a:ln w="57150">
+            <a:tailEnd type="arrow" w="lg" len="med"/>
+          </a:ln>
+        </p:spPr>
+        <p:style>
+          <a:lnRef idx="2">
+            <a:schemeClr val="accent1"/>
+          </a:lnRef>
+          <a:fillRef idx="0">
+            <a:schemeClr val="accent1"/>
+          </a:fillRef>
+          <a:effectRef idx="1">
+            <a:schemeClr val="accent1"/>
+          </a:effectRef>
+          <a:fontRef idx="minor">
+            <a:schemeClr val="tx1"/>
+          </a:fontRef>
+        </p:style>
+      </p:cxnSp>
     </p:spTree>
     <p:extLst>
       <p:ext uri="{BB962C8B-B14F-4D97-AF65-F5344CB8AC3E}">

</xml_diff>

<commit_message>
chess: ply_ag_comm(…) uses play(...) instead of ply(...) now. It also performs the upd_end_game_state(...) if play(...) is succesful.
</commit_message>
<xml_diff>
--- a/docs/chess_structure.pptx
+++ b/docs/chess_structure.pptx
@@ -3637,7 +3637,7 @@
         </p:nvSpPr>
         <p:spPr>
           <a:xfrm>
-            <a:off x="1999707" y="2534695"/>
+            <a:off x="1698988" y="2484238"/>
             <a:ext cx="2579914" cy="400110"/>
           </a:xfrm>
           <a:prstGeom prst="rect">
@@ -3786,7 +3786,7 @@
         </p:nvSpPr>
         <p:spPr>
           <a:xfrm>
-            <a:off x="7152732" y="924447"/>
+            <a:off x="6623143" y="854765"/>
             <a:ext cx="2579914" cy="400110"/>
           </a:xfrm>
           <a:prstGeom prst="rect">
@@ -3836,7 +3836,7 @@
         </p:nvSpPr>
         <p:spPr>
           <a:xfrm>
-            <a:off x="7152732" y="1522141"/>
+            <a:off x="6623143" y="1452459"/>
             <a:ext cx="2579914" cy="400110"/>
           </a:xfrm>
           <a:prstGeom prst="rect">
@@ -3874,10 +3874,10 @@
       </p:sp>
       <p:sp>
         <p:nvSpPr>
-          <p:cNvPr id="15" name="TextBox 14">
-            <a:extLst>
-              <a:ext uri="{FF2B5EF4-FFF2-40B4-BE49-F238E27FC236}">
-                <a16:creationId xmlns:a16="http://schemas.microsoft.com/office/drawing/2014/main" id="{813C98B4-7696-AA0E-9B30-332C49B37935}"/>
+          <p:cNvPr id="16" name="TextBox 15">
+            <a:extLst>
+              <a:ext uri="{FF2B5EF4-FFF2-40B4-BE49-F238E27FC236}">
+                <a16:creationId xmlns:a16="http://schemas.microsoft.com/office/drawing/2014/main" id="{56035D07-1A38-723A-2F87-FA7248A87DB5}"/>
               </a:ext>
             </a:extLst>
           </p:cNvPr>
@@ -3886,7 +3886,7 @@
         </p:nvSpPr>
         <p:spPr>
           <a:xfrm>
-            <a:off x="7152732" y="2119835"/>
+            <a:off x="6623143" y="3266390"/>
             <a:ext cx="2579914" cy="400110"/>
           </a:xfrm>
           <a:prstGeom prst="rect">
@@ -3911,8 +3911,12 @@
           <a:lstStyle/>
           <a:p>
             <a:r>
+              <a:rPr lang="fr-CA" sz="2000" dirty="0" err="1"/>
+              <a:t>promote</a:t>
+            </a:r>
+            <a:r>
               <a:rPr lang="en-US" sz="2000" dirty="0"/>
-              <a:t>ply(…)</a:t>
+              <a:t>(…)</a:t>
             </a:r>
             <a:endParaRPr lang="fr-CA" sz="2000" dirty="0"/>
           </a:p>
@@ -3920,10 +3924,10 @@
       </p:sp>
       <p:sp>
         <p:nvSpPr>
-          <p:cNvPr id="16" name="TextBox 15">
-            <a:extLst>
-              <a:ext uri="{FF2B5EF4-FFF2-40B4-BE49-F238E27FC236}">
-                <a16:creationId xmlns:a16="http://schemas.microsoft.com/office/drawing/2014/main" id="{56035D07-1A38-723A-2F87-FA7248A87DB5}"/>
+          <p:cNvPr id="3" name="TextBox 2">
+            <a:extLst>
+              <a:ext uri="{FF2B5EF4-FFF2-40B4-BE49-F238E27FC236}">
+                <a16:creationId xmlns:a16="http://schemas.microsoft.com/office/drawing/2014/main" id="{FE621ED7-3D3A-DE40-120F-6D0E3988C09D}"/>
               </a:ext>
             </a:extLst>
           </p:cNvPr>
@@ -3932,7 +3936,7 @@
         </p:nvSpPr>
         <p:spPr>
           <a:xfrm>
-            <a:off x="7152732" y="2717529"/>
+            <a:off x="6623143" y="2050153"/>
             <a:ext cx="2579914" cy="400110"/>
           </a:xfrm>
           <a:prstGeom prst="rect">
@@ -3957,14 +3961,59 @@
           <a:lstStyle/>
           <a:p>
             <a:r>
+              <a:rPr lang="en-US" sz="2000" dirty="0"/>
+              <a:t>play(…)</a:t>
+            </a:r>
+            <a:endParaRPr lang="fr-CA" sz="2000" dirty="0"/>
+          </a:p>
+        </p:txBody>
+      </p:sp>
+      <p:sp>
+        <p:nvSpPr>
+          <p:cNvPr id="5" name="TextBox 4">
+            <a:extLst>
+              <a:ext uri="{FF2B5EF4-FFF2-40B4-BE49-F238E27FC236}">
+                <a16:creationId xmlns:a16="http://schemas.microsoft.com/office/drawing/2014/main" id="{3433A7A9-C1D1-BC11-C8E2-D2355A47329A}"/>
+              </a:ext>
+            </a:extLst>
+          </p:cNvPr>
+          <p:cNvSpPr txBox="1"/>
+          <p:nvPr/>
+        </p:nvSpPr>
+        <p:spPr>
+          <a:xfrm>
+            <a:off x="6623143" y="2647847"/>
+            <a:ext cx="3051038" cy="400110"/>
+          </a:xfrm>
+          <a:prstGeom prst="rect">
+            <a:avLst/>
+          </a:prstGeom>
+          <a:solidFill>
+            <a:schemeClr val="accent6">
+              <a:lumMod val="60000"/>
+              <a:lumOff val="40000"/>
+            </a:schemeClr>
+          </a:solidFill>
+          <a:ln>
+            <a:solidFill>
+              <a:schemeClr val="tx1"/>
+            </a:solidFill>
+          </a:ln>
+        </p:spPr>
+        <p:txBody>
+          <a:bodyPr wrap="square" rtlCol="0">
+            <a:spAutoFit/>
+          </a:bodyPr>
+          <a:lstStyle/>
+          <a:p>
+            <a:r>
               <a:rPr lang="fr-CA" sz="2000" dirty="0" err="1"/>
-              <a:t>promote</a:t>
-            </a:r>
-            <a:r>
-              <a:rPr lang="en-US" sz="2000" dirty="0"/>
+              <a:t>upd_end_game_state</a:t>
+            </a:r>
+            <a:r>
+              <a:rPr lang="fr-CA" sz="2000" dirty="0"/>
               <a:t>(…)</a:t>
             </a:r>
-            <a:endParaRPr lang="fr-CA" sz="2000" dirty="0"/>
           </a:p>
         </p:txBody>
       </p:sp>
@@ -4972,7 +5021,7 @@
         </p:nvSpPr>
         <p:spPr>
           <a:xfrm>
-            <a:off x="667476" y="4506340"/>
+            <a:off x="663076" y="4950815"/>
             <a:ext cx="2579914" cy="400110"/>
           </a:xfrm>
           <a:prstGeom prst="rect">
@@ -5210,10 +5259,10 @@
       </p:sp>
       <p:sp>
         <p:nvSpPr>
-          <p:cNvPr id="13" name="TextBox 12">
-            <a:extLst>
-              <a:ext uri="{FF2B5EF4-FFF2-40B4-BE49-F238E27FC236}">
-                <a16:creationId xmlns:a16="http://schemas.microsoft.com/office/drawing/2014/main" id="{4A13A9EB-813E-55FA-2F6E-5359E0019D53}"/>
+          <p:cNvPr id="14" name="TextBox 13">
+            <a:extLst>
+              <a:ext uri="{FF2B5EF4-FFF2-40B4-BE49-F238E27FC236}">
+                <a16:creationId xmlns:a16="http://schemas.microsoft.com/office/drawing/2014/main" id="{C52D4EBC-08D5-6172-3CB8-98A4DB377EB5}"/>
               </a:ext>
             </a:extLst>
           </p:cNvPr>
@@ -5222,7 +5271,7 @@
         </p:nvSpPr>
         <p:spPr>
           <a:xfrm>
-            <a:off x="1003028" y="3612064"/>
+            <a:off x="998628" y="4503677"/>
             <a:ext cx="2579914" cy="400110"/>
           </a:xfrm>
           <a:prstGeom prst="rect">
@@ -5247,8 +5296,12 @@
           <a:lstStyle/>
           <a:p>
             <a:r>
+              <a:rPr lang="fr-CA" sz="2000" dirty="0" err="1"/>
+              <a:t>promote</a:t>
+            </a:r>
+            <a:r>
               <a:rPr lang="en-US" sz="2000" dirty="0"/>
-              <a:t>ply(…)</a:t>
+              <a:t>(…)</a:t>
             </a:r>
             <a:endParaRPr lang="fr-CA" sz="2000" dirty="0"/>
           </a:p>
@@ -5256,10 +5309,10 @@
       </p:sp>
       <p:sp>
         <p:nvSpPr>
-          <p:cNvPr id="14" name="TextBox 13">
-            <a:extLst>
-              <a:ext uri="{FF2B5EF4-FFF2-40B4-BE49-F238E27FC236}">
-                <a16:creationId xmlns:a16="http://schemas.microsoft.com/office/drawing/2014/main" id="{C52D4EBC-08D5-6172-3CB8-98A4DB377EB5}"/>
+          <p:cNvPr id="19" name="TextBox 18">
+            <a:extLst>
+              <a:ext uri="{FF2B5EF4-FFF2-40B4-BE49-F238E27FC236}">
+                <a16:creationId xmlns:a16="http://schemas.microsoft.com/office/drawing/2014/main" id="{E9A46817-11A8-A9D0-1FD9-1C88F2F8D6BE}"/>
               </a:ext>
             </a:extLst>
           </p:cNvPr>
@@ -5268,7 +5321,7 @@
         </p:nvSpPr>
         <p:spPr>
           <a:xfrm>
-            <a:off x="1003028" y="4059202"/>
+            <a:off x="4691790" y="3604461"/>
             <a:ext cx="2579914" cy="400110"/>
           </a:xfrm>
           <a:prstGeom prst="rect">
@@ -5293,12 +5346,8 @@
           <a:lstStyle/>
           <a:p>
             <a:r>
-              <a:rPr lang="fr-CA" sz="2000" dirty="0" err="1"/>
-              <a:t>promote</a:t>
-            </a:r>
-            <a:r>
               <a:rPr lang="en-US" sz="2000" dirty="0"/>
-              <a:t>(…)</a:t>
+              <a:t>ply(…)</a:t>
             </a:r>
             <a:endParaRPr lang="fr-CA" sz="2000" dirty="0"/>
           </a:p>
@@ -5306,10 +5355,10 @@
       </p:sp>
       <p:sp>
         <p:nvSpPr>
-          <p:cNvPr id="19" name="TextBox 18">
-            <a:extLst>
-              <a:ext uri="{FF2B5EF4-FFF2-40B4-BE49-F238E27FC236}">
-                <a16:creationId xmlns:a16="http://schemas.microsoft.com/office/drawing/2014/main" id="{E9A46817-11A8-A9D0-1FD9-1C88F2F8D6BE}"/>
+          <p:cNvPr id="20" name="TextBox 19">
+            <a:extLst>
+              <a:ext uri="{FF2B5EF4-FFF2-40B4-BE49-F238E27FC236}">
+                <a16:creationId xmlns:a16="http://schemas.microsoft.com/office/drawing/2014/main" id="{A5BB8364-0406-E1DA-2C52-E02981F0FC1D}"/>
               </a:ext>
             </a:extLst>
           </p:cNvPr>
@@ -5318,7 +5367,7 @@
         </p:nvSpPr>
         <p:spPr>
           <a:xfrm>
-            <a:off x="4691790" y="3604461"/>
+            <a:off x="5316949" y="4985114"/>
             <a:ext cx="2579914" cy="400110"/>
           </a:xfrm>
           <a:prstGeom prst="rect">
@@ -5344,7 +5393,7 @@
           <a:p>
             <a:r>
               <a:rPr lang="en-US" sz="2000" dirty="0"/>
-              <a:t>ply(…)</a:t>
+              <a:t>play(…)</a:t>
             </a:r>
             <a:endParaRPr lang="fr-CA" sz="2000" dirty="0"/>
           </a:p>
@@ -5352,10 +5401,10 @@
       </p:sp>
       <p:sp>
         <p:nvSpPr>
-          <p:cNvPr id="20" name="TextBox 19">
-            <a:extLst>
-              <a:ext uri="{FF2B5EF4-FFF2-40B4-BE49-F238E27FC236}">
-                <a16:creationId xmlns:a16="http://schemas.microsoft.com/office/drawing/2014/main" id="{A5BB8364-0406-E1DA-2C52-E02981F0FC1D}"/>
+          <p:cNvPr id="21" name="TextBox 20">
+            <a:extLst>
+              <a:ext uri="{FF2B5EF4-FFF2-40B4-BE49-F238E27FC236}">
+                <a16:creationId xmlns:a16="http://schemas.microsoft.com/office/drawing/2014/main" id="{3385DAC2-EEE3-1873-E657-1790B2E43388}"/>
               </a:ext>
             </a:extLst>
           </p:cNvPr>
@@ -5364,16 +5413,16 @@
         </p:nvSpPr>
         <p:spPr>
           <a:xfrm>
-            <a:off x="5316949" y="4985114"/>
+            <a:off x="4985525" y="4056664"/>
             <a:ext cx="2579914" cy="400110"/>
           </a:xfrm>
           <a:prstGeom prst="rect">
             <a:avLst/>
           </a:prstGeom>
           <a:solidFill>
-            <a:schemeClr val="accent6">
-              <a:lumMod val="60000"/>
-              <a:lumOff val="40000"/>
+            <a:schemeClr val="tx2">
+              <a:lumMod val="50000"/>
+              <a:lumOff val="50000"/>
             </a:schemeClr>
           </a:solidFill>
           <a:ln>
@@ -5389,8 +5438,12 @@
           <a:lstStyle/>
           <a:p>
             <a:r>
+              <a:rPr lang="fr-CA" sz="2000" dirty="0" err="1"/>
+              <a:t>is_move_valid</a:t>
+            </a:r>
+            <a:r>
               <a:rPr lang="en-US" sz="2000" dirty="0"/>
-              <a:t>play(…)</a:t>
+              <a:t>(…)</a:t>
             </a:r>
             <a:endParaRPr lang="fr-CA" sz="2000" dirty="0"/>
           </a:p>
@@ -5398,10 +5451,10 @@
       </p:sp>
       <p:sp>
         <p:nvSpPr>
-          <p:cNvPr id="21" name="TextBox 20">
-            <a:extLst>
-              <a:ext uri="{FF2B5EF4-FFF2-40B4-BE49-F238E27FC236}">
-                <a16:creationId xmlns:a16="http://schemas.microsoft.com/office/drawing/2014/main" id="{3385DAC2-EEE3-1873-E657-1790B2E43388}"/>
+          <p:cNvPr id="22" name="TextBox 21">
+            <a:extLst>
+              <a:ext uri="{FF2B5EF4-FFF2-40B4-BE49-F238E27FC236}">
+                <a16:creationId xmlns:a16="http://schemas.microsoft.com/office/drawing/2014/main" id="{76B8CB29-826E-426D-C4A8-BADC4611EE6B}"/>
               </a:ext>
             </a:extLst>
           </p:cNvPr>
@@ -5410,7 +5463,7 @@
         </p:nvSpPr>
         <p:spPr>
           <a:xfrm>
-            <a:off x="4985525" y="4056664"/>
+            <a:off x="4985525" y="4518861"/>
             <a:ext cx="2579914" cy="400110"/>
           </a:xfrm>
           <a:prstGeom prst="rect">
@@ -5436,7 +5489,7 @@
           <a:p>
             <a:r>
               <a:rPr lang="fr-CA" sz="2000" dirty="0" err="1"/>
-              <a:t>is_move_valid</a:t>
+              <a:t>is_atk_valid</a:t>
             </a:r>
             <a:r>
               <a:rPr lang="en-US" sz="2000" dirty="0"/>
@@ -5448,10 +5501,10 @@
       </p:sp>
       <p:sp>
         <p:nvSpPr>
-          <p:cNvPr id="22" name="TextBox 21">
-            <a:extLst>
-              <a:ext uri="{FF2B5EF4-FFF2-40B4-BE49-F238E27FC236}">
-                <a16:creationId xmlns:a16="http://schemas.microsoft.com/office/drawing/2014/main" id="{76B8CB29-826E-426D-C4A8-BADC4611EE6B}"/>
+          <p:cNvPr id="23" name="TextBox 22">
+            <a:extLst>
+              <a:ext uri="{FF2B5EF4-FFF2-40B4-BE49-F238E27FC236}">
+                <a16:creationId xmlns:a16="http://schemas.microsoft.com/office/drawing/2014/main" id="{8C6A4599-E218-7F5B-320B-B00226D769EB}"/>
               </a:ext>
             </a:extLst>
           </p:cNvPr>
@@ -5460,57 +5513,7 @@
         </p:nvSpPr>
         <p:spPr>
           <a:xfrm>
-            <a:off x="4985525" y="4518861"/>
-            <a:ext cx="2579914" cy="400110"/>
-          </a:xfrm>
-          <a:prstGeom prst="rect">
-            <a:avLst/>
-          </a:prstGeom>
-          <a:solidFill>
-            <a:schemeClr val="tx2">
-              <a:lumMod val="50000"/>
-              <a:lumOff val="50000"/>
-            </a:schemeClr>
-          </a:solidFill>
-          <a:ln>
-            <a:solidFill>
-              <a:schemeClr val="tx1"/>
-            </a:solidFill>
-          </a:ln>
-        </p:spPr>
-        <p:txBody>
-          <a:bodyPr wrap="square" rtlCol="0">
-            <a:spAutoFit/>
-          </a:bodyPr>
-          <a:lstStyle/>
-          <a:p>
-            <a:r>
-              <a:rPr lang="fr-CA" sz="2000" dirty="0" err="1"/>
-              <a:t>is_atk_valid</a:t>
-            </a:r>
-            <a:r>
-              <a:rPr lang="en-US" sz="2000" dirty="0"/>
-              <a:t>(…)</a:t>
-            </a:r>
-            <a:endParaRPr lang="fr-CA" sz="2000" dirty="0"/>
-          </a:p>
-        </p:txBody>
-      </p:sp>
-      <p:sp>
-        <p:nvSpPr>
-          <p:cNvPr id="23" name="TextBox 22">
-            <a:extLst>
-              <a:ext uri="{FF2B5EF4-FFF2-40B4-BE49-F238E27FC236}">
-                <a16:creationId xmlns:a16="http://schemas.microsoft.com/office/drawing/2014/main" id="{8C6A4599-E218-7F5B-320B-B00226D769EB}"/>
-              </a:ext>
-            </a:extLst>
-          </p:cNvPr>
-          <p:cNvSpPr txBox="1"/>
-          <p:nvPr/>
-        </p:nvSpPr>
-        <p:spPr>
-          <a:xfrm>
-            <a:off x="5316949" y="5423707"/>
+            <a:off x="5586142" y="5423927"/>
             <a:ext cx="2579914" cy="400110"/>
           </a:xfrm>
           <a:prstGeom prst="rect">
@@ -5980,49 +5983,101 @@
           </a:fontRef>
         </p:style>
       </p:cxnSp>
-      <p:cxnSp>
-        <p:nvCxnSpPr>
-          <p:cNvPr id="18" name="Straight Arrow Connector 17">
-            <a:extLst>
-              <a:ext uri="{FF2B5EF4-FFF2-40B4-BE49-F238E27FC236}">
-                <a16:creationId xmlns:a16="http://schemas.microsoft.com/office/drawing/2014/main" id="{73BE38C0-A4EC-0577-9DC1-933AA1328461}"/>
-              </a:ext>
-            </a:extLst>
-          </p:cNvPr>
-          <p:cNvCxnSpPr>
-            <a:cxnSpLocks/>
-            <a:stCxn id="13" idx="3"/>
-            <a:endCxn id="19" idx="1"/>
-          </p:cNvCxnSpPr>
+      <p:sp>
+        <p:nvSpPr>
+          <p:cNvPr id="33" name="TextBox 32">
+            <a:extLst>
+              <a:ext uri="{FF2B5EF4-FFF2-40B4-BE49-F238E27FC236}">
+                <a16:creationId xmlns:a16="http://schemas.microsoft.com/office/drawing/2014/main" id="{AB511B3A-5A84-AAC3-1BAF-E132B538220D}"/>
+              </a:ext>
+            </a:extLst>
+          </p:cNvPr>
+          <p:cNvSpPr txBox="1"/>
           <p:nvPr/>
-        </p:nvCxnSpPr>
-        <p:spPr>
-          <a:xfrm flipV="1">
-            <a:off x="3582942" y="3804516"/>
-            <a:ext cx="1108848" cy="7603"/>
-          </a:xfrm>
-          <a:prstGeom prst="straightConnector1">
+        </p:nvSpPr>
+        <p:spPr>
+          <a:xfrm>
+            <a:off x="1003028" y="3612064"/>
+            <a:ext cx="2579914" cy="400110"/>
+          </a:xfrm>
+          <a:prstGeom prst="rect">
             <a:avLst/>
           </a:prstGeom>
-          <a:ln w="57150">
-            <a:tailEnd type="arrow" w="lg" len="med"/>
+          <a:solidFill>
+            <a:schemeClr val="accent6">
+              <a:lumMod val="60000"/>
+              <a:lumOff val="40000"/>
+            </a:schemeClr>
+          </a:solidFill>
+          <a:ln>
+            <a:solidFill>
+              <a:schemeClr val="tx1"/>
+            </a:solidFill>
           </a:ln>
         </p:spPr>
-        <p:style>
-          <a:lnRef idx="2">
-            <a:schemeClr val="accent1"/>
-          </a:lnRef>
-          <a:fillRef idx="0">
-            <a:schemeClr val="accent1"/>
-          </a:fillRef>
-          <a:effectRef idx="1">
-            <a:schemeClr val="accent1"/>
-          </a:effectRef>
-          <a:fontRef idx="minor">
-            <a:schemeClr val="tx1"/>
-          </a:fontRef>
-        </p:style>
-      </p:cxnSp>
+        <p:txBody>
+          <a:bodyPr wrap="square" rtlCol="0">
+            <a:spAutoFit/>
+          </a:bodyPr>
+          <a:lstStyle/>
+          <a:p>
+            <a:r>
+              <a:rPr lang="en-US" sz="2000" dirty="0"/>
+              <a:t>play(…)</a:t>
+            </a:r>
+            <a:endParaRPr lang="fr-CA" sz="2000" dirty="0"/>
+          </a:p>
+        </p:txBody>
+      </p:sp>
+      <p:sp>
+        <p:nvSpPr>
+          <p:cNvPr id="35" name="TextBox 34">
+            <a:extLst>
+              <a:ext uri="{FF2B5EF4-FFF2-40B4-BE49-F238E27FC236}">
+                <a16:creationId xmlns:a16="http://schemas.microsoft.com/office/drawing/2014/main" id="{9FDE29C1-87C5-A439-6DB9-3F9397C706DD}"/>
+              </a:ext>
+            </a:extLst>
+          </p:cNvPr>
+          <p:cNvSpPr txBox="1"/>
+          <p:nvPr/>
+        </p:nvSpPr>
+        <p:spPr>
+          <a:xfrm>
+            <a:off x="998628" y="4072663"/>
+            <a:ext cx="3051038" cy="400110"/>
+          </a:xfrm>
+          <a:prstGeom prst="rect">
+            <a:avLst/>
+          </a:prstGeom>
+          <a:solidFill>
+            <a:schemeClr val="accent6">
+              <a:lumMod val="60000"/>
+              <a:lumOff val="40000"/>
+            </a:schemeClr>
+          </a:solidFill>
+          <a:ln>
+            <a:solidFill>
+              <a:schemeClr val="tx1"/>
+            </a:solidFill>
+          </a:ln>
+        </p:spPr>
+        <p:txBody>
+          <a:bodyPr wrap="square" rtlCol="0">
+            <a:spAutoFit/>
+          </a:bodyPr>
+          <a:lstStyle/>
+          <a:p>
+            <a:r>
+              <a:rPr lang="fr-CA" sz="2000" dirty="0" err="1"/>
+              <a:t>upd_end_game_state</a:t>
+            </a:r>
+            <a:r>
+              <a:rPr lang="fr-CA" sz="2000" dirty="0"/>
+              <a:t>(…)</a:t>
+            </a:r>
+          </a:p>
+        </p:txBody>
+      </p:sp>
     </p:spTree>
     <p:extLst>
       <p:ext uri="{BB962C8B-B14F-4D97-AF65-F5344CB8AC3E}">

</xml_diff>

<commit_message>
chess: added is_psbl_alg_comm_upd and all_psbl_alg_comm to help keep track of available plays for AI to use.
</commit_message>
<xml_diff>
--- a/docs/chess_structure.pptx
+++ b/docs/chess_structure.pptx
@@ -4691,7 +4691,7 @@
         </p:nvSpPr>
         <p:spPr>
           <a:xfrm>
-            <a:off x="1444081" y="1876153"/>
+            <a:off x="1444081" y="1776125"/>
             <a:ext cx="3371124" cy="400110"/>
           </a:xfrm>
           <a:prstGeom prst="rect">
@@ -4768,6 +4768,56 @@
             <a:r>
               <a:rPr lang="fr-CA" sz="2000" dirty="0" err="1"/>
               <a:t>is_move_valid</a:t>
+            </a:r>
+            <a:r>
+              <a:rPr lang="en-US" sz="2000" dirty="0"/>
+              <a:t>(…)</a:t>
+            </a:r>
+            <a:endParaRPr lang="fr-CA" sz="2000" dirty="0"/>
+          </a:p>
+        </p:txBody>
+      </p:sp>
+      <p:sp>
+        <p:nvSpPr>
+          <p:cNvPr id="2" name="TextBox 1">
+            <a:extLst>
+              <a:ext uri="{FF2B5EF4-FFF2-40B4-BE49-F238E27FC236}">
+                <a16:creationId xmlns:a16="http://schemas.microsoft.com/office/drawing/2014/main" id="{F1BB82F0-A236-E7D9-A6A2-43E34808568D}"/>
+              </a:ext>
+            </a:extLst>
+          </p:cNvPr>
+          <p:cNvSpPr txBox="1"/>
+          <p:nvPr/>
+        </p:nvSpPr>
+        <p:spPr>
+          <a:xfrm>
+            <a:off x="1444081" y="2243062"/>
+            <a:ext cx="3371124" cy="400110"/>
+          </a:xfrm>
+          <a:prstGeom prst="rect">
+            <a:avLst/>
+          </a:prstGeom>
+          <a:solidFill>
+            <a:schemeClr val="tx2">
+              <a:lumMod val="50000"/>
+              <a:lumOff val="50000"/>
+            </a:schemeClr>
+          </a:solidFill>
+          <a:ln>
+            <a:solidFill>
+              <a:schemeClr val="tx1"/>
+            </a:solidFill>
+          </a:ln>
+        </p:spPr>
+        <p:txBody>
+          <a:bodyPr wrap="square" rtlCol="0">
+            <a:spAutoFit/>
+          </a:bodyPr>
+          <a:lstStyle/>
+          <a:p>
+            <a:r>
+              <a:rPr lang="fr-CA" sz="2000" dirty="0" err="1"/>
+              <a:t>is_atk_valid</a:t>
             </a:r>
             <a:r>
               <a:rPr lang="en-US" sz="2000" dirty="0"/>
@@ -5367,7 +5417,7 @@
         </p:nvSpPr>
         <p:spPr>
           <a:xfrm>
-            <a:off x="5316949" y="4985114"/>
+            <a:off x="4985525" y="4971064"/>
             <a:ext cx="2579914" cy="400110"/>
           </a:xfrm>
           <a:prstGeom prst="rect">
@@ -5612,7 +5662,7 @@
         </p:nvSpPr>
         <p:spPr>
           <a:xfrm>
-            <a:off x="5855335" y="888135"/>
+            <a:off x="5802265" y="659417"/>
             <a:ext cx="3371124" cy="400110"/>
           </a:xfrm>
           <a:prstGeom prst="rect">
@@ -5662,7 +5712,7 @@
         </p:nvSpPr>
         <p:spPr>
           <a:xfrm>
-            <a:off x="6149070" y="1345335"/>
+            <a:off x="6096000" y="1116617"/>
             <a:ext cx="3371124" cy="400110"/>
           </a:xfrm>
           <a:prstGeom prst="rect">
@@ -5712,7 +5762,7 @@
         </p:nvSpPr>
         <p:spPr>
           <a:xfrm>
-            <a:off x="5586142" y="441575"/>
+            <a:off x="5533072" y="212857"/>
             <a:ext cx="3371124" cy="400110"/>
           </a:xfrm>
           <a:prstGeom prst="rect">
@@ -5915,8 +5965,8 @@
         </p:nvCxnSpPr>
         <p:spPr>
           <a:xfrm flipV="1">
-            <a:off x="4376057" y="641630"/>
-            <a:ext cx="1210085" cy="954739"/>
+            <a:off x="4376057" y="412912"/>
+            <a:ext cx="1157015" cy="1183457"/>
           </a:xfrm>
           <a:prstGeom prst="straightConnector1">
             <a:avLst/>
@@ -6075,6 +6125,56 @@
               <a:rPr lang="fr-CA" sz="2000" dirty="0"/>
               <a:t>(…)</a:t>
             </a:r>
+          </a:p>
+        </p:txBody>
+      </p:sp>
+      <p:sp>
+        <p:nvSpPr>
+          <p:cNvPr id="36" name="TextBox 35">
+            <a:extLst>
+              <a:ext uri="{FF2B5EF4-FFF2-40B4-BE49-F238E27FC236}">
+                <a16:creationId xmlns:a16="http://schemas.microsoft.com/office/drawing/2014/main" id="{CF0A98F0-EF5E-26C8-FEFE-C6EE4098E80A}"/>
+              </a:ext>
+            </a:extLst>
+          </p:cNvPr>
+          <p:cNvSpPr txBox="1"/>
+          <p:nvPr/>
+        </p:nvSpPr>
+        <p:spPr>
+          <a:xfrm>
+            <a:off x="6096000" y="1557269"/>
+            <a:ext cx="3371124" cy="400110"/>
+          </a:xfrm>
+          <a:prstGeom prst="rect">
+            <a:avLst/>
+          </a:prstGeom>
+          <a:solidFill>
+            <a:schemeClr val="tx2">
+              <a:lumMod val="50000"/>
+              <a:lumOff val="50000"/>
+            </a:schemeClr>
+          </a:solidFill>
+          <a:ln>
+            <a:solidFill>
+              <a:schemeClr val="tx1"/>
+            </a:solidFill>
+          </a:ln>
+        </p:spPr>
+        <p:txBody>
+          <a:bodyPr wrap="square" rtlCol="0">
+            <a:spAutoFit/>
+          </a:bodyPr>
+          <a:lstStyle/>
+          <a:p>
+            <a:r>
+              <a:rPr lang="fr-CA" sz="2000" dirty="0" err="1"/>
+              <a:t>is_atk_valid</a:t>
+            </a:r>
+            <a:r>
+              <a:rPr lang="en-US" sz="2000" dirty="0"/>
+              <a:t>(…)</a:t>
+            </a:r>
+            <a:endParaRPr lang="fr-CA" sz="2000" dirty="0"/>
           </a:p>
         </p:txBody>
       </p:sp>

</xml_diff>

<commit_message>
chess: getAll_psbl_alg_comm() renamed to get_all_psbl_alg_comm().
</commit_message>
<xml_diff>
--- a/docs/chess_structure.pptx
+++ b/docs/chess_structure.pptx
@@ -265,7 +265,7 @@
           <a:p>
             <a:fld id="{3C86F9F8-2D2A-4D0A-8098-1A54311CFD56}" type="datetimeFigureOut">
               <a:rPr lang="fr-CA" smtClean="0"/>
-              <a:t>2025-12-11</a:t>
+              <a:t>2025-12-12</a:t>
             </a:fld>
             <a:endParaRPr lang="fr-CA"/>
           </a:p>
@@ -465,7 +465,7 @@
           <a:p>
             <a:fld id="{3C86F9F8-2D2A-4D0A-8098-1A54311CFD56}" type="datetimeFigureOut">
               <a:rPr lang="fr-CA" smtClean="0"/>
-              <a:t>2025-12-11</a:t>
+              <a:t>2025-12-12</a:t>
             </a:fld>
             <a:endParaRPr lang="fr-CA"/>
           </a:p>
@@ -675,7 +675,7 @@
           <a:p>
             <a:fld id="{3C86F9F8-2D2A-4D0A-8098-1A54311CFD56}" type="datetimeFigureOut">
               <a:rPr lang="fr-CA" smtClean="0"/>
-              <a:t>2025-12-11</a:t>
+              <a:t>2025-12-12</a:t>
             </a:fld>
             <a:endParaRPr lang="fr-CA"/>
           </a:p>
@@ -875,7 +875,7 @@
           <a:p>
             <a:fld id="{3C86F9F8-2D2A-4D0A-8098-1A54311CFD56}" type="datetimeFigureOut">
               <a:rPr lang="fr-CA" smtClean="0"/>
-              <a:t>2025-12-11</a:t>
+              <a:t>2025-12-12</a:t>
             </a:fld>
             <a:endParaRPr lang="fr-CA"/>
           </a:p>
@@ -1151,7 +1151,7 @@
           <a:p>
             <a:fld id="{3C86F9F8-2D2A-4D0A-8098-1A54311CFD56}" type="datetimeFigureOut">
               <a:rPr lang="fr-CA" smtClean="0"/>
-              <a:t>2025-12-11</a:t>
+              <a:t>2025-12-12</a:t>
             </a:fld>
             <a:endParaRPr lang="fr-CA"/>
           </a:p>
@@ -1419,7 +1419,7 @@
           <a:p>
             <a:fld id="{3C86F9F8-2D2A-4D0A-8098-1A54311CFD56}" type="datetimeFigureOut">
               <a:rPr lang="fr-CA" smtClean="0"/>
-              <a:t>2025-12-11</a:t>
+              <a:t>2025-12-12</a:t>
             </a:fld>
             <a:endParaRPr lang="fr-CA"/>
           </a:p>
@@ -1834,7 +1834,7 @@
           <a:p>
             <a:fld id="{3C86F9F8-2D2A-4D0A-8098-1A54311CFD56}" type="datetimeFigureOut">
               <a:rPr lang="fr-CA" smtClean="0"/>
-              <a:t>2025-12-11</a:t>
+              <a:t>2025-12-12</a:t>
             </a:fld>
             <a:endParaRPr lang="fr-CA"/>
           </a:p>
@@ -1976,7 +1976,7 @@
           <a:p>
             <a:fld id="{3C86F9F8-2D2A-4D0A-8098-1A54311CFD56}" type="datetimeFigureOut">
               <a:rPr lang="fr-CA" smtClean="0"/>
-              <a:t>2025-12-11</a:t>
+              <a:t>2025-12-12</a:t>
             </a:fld>
             <a:endParaRPr lang="fr-CA"/>
           </a:p>
@@ -2089,7 +2089,7 @@
           <a:p>
             <a:fld id="{3C86F9F8-2D2A-4D0A-8098-1A54311CFD56}" type="datetimeFigureOut">
               <a:rPr lang="fr-CA" smtClean="0"/>
-              <a:t>2025-12-11</a:t>
+              <a:t>2025-12-12</a:t>
             </a:fld>
             <a:endParaRPr lang="fr-CA"/>
           </a:p>
@@ -2402,7 +2402,7 @@
           <a:p>
             <a:fld id="{3C86F9F8-2D2A-4D0A-8098-1A54311CFD56}" type="datetimeFigureOut">
               <a:rPr lang="fr-CA" smtClean="0"/>
-              <a:t>2025-12-11</a:t>
+              <a:t>2025-12-12</a:t>
             </a:fld>
             <a:endParaRPr lang="fr-CA"/>
           </a:p>
@@ -2691,7 +2691,7 @@
           <a:p>
             <a:fld id="{3C86F9F8-2D2A-4D0A-8098-1A54311CFD56}" type="datetimeFigureOut">
               <a:rPr lang="fr-CA" smtClean="0"/>
-              <a:t>2025-12-11</a:t>
+              <a:t>2025-12-12</a:t>
             </a:fld>
             <a:endParaRPr lang="fr-CA"/>
           </a:p>
@@ -2934,7 +2934,7 @@
           <a:p>
             <a:fld id="{3C86F9F8-2D2A-4D0A-8098-1A54311CFD56}" type="datetimeFigureOut">
               <a:rPr lang="fr-CA" smtClean="0"/>
-              <a:t>2025-12-11</a:t>
+              <a:t>2025-12-12</a:t>
             </a:fld>
             <a:endParaRPr lang="fr-CA"/>
           </a:p>
@@ -4187,7 +4187,7 @@
           <a:p>
             <a:r>
               <a:rPr lang="en-CA" sz="2000" dirty="0" err="1"/>
-              <a:t>get_all_psbl_alg_comm</a:t>
+              <a:t>getAll_psbl_alg_comm</a:t>
             </a:r>
             <a:r>
               <a:rPr lang="en-US" sz="2000" dirty="0"/>
@@ -4337,7 +4337,7 @@
           <a:p>
             <a:r>
               <a:rPr lang="en-CA" sz="2000" dirty="0" err="1"/>
-              <a:t>get_all_psbl_alg_comm</a:t>
+              <a:t>getAll_psbl_alg_comm</a:t>
             </a:r>
             <a:r>
               <a:rPr lang="en-US" sz="2000" dirty="0"/>
@@ -4997,7 +4997,7 @@
           <a:p>
             <a:r>
               <a:rPr lang="en-CA" sz="2000" dirty="0" err="1"/>
-              <a:t>get_all_psbl_alg_comm</a:t>
+              <a:t>getAll_psbl_alg_comm</a:t>
             </a:r>
             <a:r>
               <a:rPr lang="en-US" sz="2000" dirty="0"/>

</xml_diff>

<commit_message>
chess: added all_valid_moves and all_valid_atks and all their related support functions.
</commit_message>
<xml_diff>
--- a/docs/chess_structure.pptx
+++ b/docs/chess_structure.pptx
@@ -4187,7 +4187,7 @@
           <a:p>
             <a:r>
               <a:rPr lang="en-CA" sz="2000" dirty="0" err="1"/>
-              <a:t>getAll_psbl_alg_comm</a:t>
+              <a:t>get_all_psbl_alg_comm</a:t>
             </a:r>
             <a:r>
               <a:rPr lang="en-US" sz="2000" dirty="0"/>
@@ -4337,7 +4337,7 @@
           <a:p>
             <a:r>
               <a:rPr lang="en-CA" sz="2000" dirty="0" err="1"/>
-              <a:t>getAll_psbl_alg_comm</a:t>
+              <a:t>get_all_psbl_alg_comm</a:t>
             </a:r>
             <a:r>
               <a:rPr lang="en-US" sz="2000" dirty="0"/>
@@ -4997,7 +4997,7 @@
           <a:p>
             <a:r>
               <a:rPr lang="en-CA" sz="2000" dirty="0" err="1"/>
-              <a:t>getAll_psbl_alg_comm</a:t>
+              <a:t>get_all_psbl_alg_comm</a:t>
             </a:r>
             <a:r>
               <a:rPr lang="en-US" sz="2000" dirty="0"/>

</xml_diff>